<commit_message>
Finished presentation for the course
</commit_message>
<xml_diff>
--- a/project/ethereum/presentation/Paper Presentation.pptx
+++ b/project/ethereum/presentation/Paper Presentation.pptx
@@ -720,166 +720,6 @@
           <a:bodyPr/>
           <a:lstStyle/>
           <a:p>
-            <a:pPr marL="0" marR="0" lvl="0" indent="0" algn="l" defTabSz="914400" rtl="0" eaLnBrk="1" fontAlgn="auto" latinLnBrk="0" hangingPunct="1">
-              <a:lnSpc>
-                <a:spcPct val="100000"/>
-              </a:lnSpc>
-              <a:spcBef>
-                <a:spcPts val="0"/>
-              </a:spcBef>
-              <a:spcAft>
-                <a:spcPts val="0"/>
-              </a:spcAft>
-              <a:buClrTx/>
-              <a:buSzTx/>
-              <a:buFontTx/>
-              <a:buNone/>
-              <a:tabLst/>
-              <a:defRPr/>
-            </a:pPr>
-            <a:r>
-              <a:rPr lang="en-CA" sz="1200" kern="1200" dirty="0">
-                <a:solidFill>
-                  <a:schemeClr val="tx1"/>
-                </a:solidFill>
-                <a:effectLst/>
-                <a:latin typeface="+mn-lt"/>
-                <a:ea typeface="+mn-ea"/>
-                <a:cs typeface="+mn-cs"/>
-              </a:rPr>
-              <a:t>The paper that I will be presenting today is “Inferring the Interplay Between Network Structure and Market Effects in Bitcoin”. This paper was published in the New Journal of Physics in 2014 and it was wrote by Daniel Kondor, Istvan </a:t>
-            </a:r>
-            <a:r>
-              <a:rPr lang="en-CA" sz="1200" kern="1200" dirty="0" err="1">
-                <a:solidFill>
-                  <a:schemeClr val="tx1"/>
-                </a:solidFill>
-                <a:effectLst/>
-                <a:latin typeface="+mn-lt"/>
-                <a:ea typeface="+mn-ea"/>
-                <a:cs typeface="+mn-cs"/>
-              </a:rPr>
-              <a:t>Csabai</a:t>
-            </a:r>
-            <a:r>
-              <a:rPr lang="en-CA" sz="1200" kern="1200" dirty="0">
-                <a:solidFill>
-                  <a:schemeClr val="tx1"/>
-                </a:solidFill>
-                <a:effectLst/>
-                <a:latin typeface="+mn-lt"/>
-                <a:ea typeface="+mn-ea"/>
-                <a:cs typeface="+mn-cs"/>
-              </a:rPr>
-              <a:t>, Janos </a:t>
-            </a:r>
-            <a:r>
-              <a:rPr lang="en-CA" sz="1200" kern="1200" dirty="0" err="1">
-                <a:solidFill>
-                  <a:schemeClr val="tx1"/>
-                </a:solidFill>
-                <a:effectLst/>
-                <a:latin typeface="+mn-lt"/>
-                <a:ea typeface="+mn-ea"/>
-                <a:cs typeface="+mn-cs"/>
-              </a:rPr>
-              <a:t>Szule</a:t>
-            </a:r>
-            <a:r>
-              <a:rPr lang="en-CA" sz="1200" kern="1200" dirty="0">
-                <a:solidFill>
-                  <a:schemeClr val="tx1"/>
-                </a:solidFill>
-                <a:effectLst/>
-                <a:latin typeface="+mn-lt"/>
-                <a:ea typeface="+mn-ea"/>
-                <a:cs typeface="+mn-cs"/>
-              </a:rPr>
-              <a:t>, </a:t>
-            </a:r>
-            <a:r>
-              <a:rPr lang="en-CA" sz="1200" kern="1200" dirty="0" err="1">
-                <a:solidFill>
-                  <a:schemeClr val="tx1"/>
-                </a:solidFill>
-                <a:effectLst/>
-                <a:latin typeface="+mn-lt"/>
-                <a:ea typeface="+mn-ea"/>
-                <a:cs typeface="+mn-cs"/>
-              </a:rPr>
-              <a:t>Marton</a:t>
-            </a:r>
-            <a:r>
-              <a:rPr lang="en-CA" sz="1200" kern="1200" dirty="0">
-                <a:solidFill>
-                  <a:schemeClr val="tx1"/>
-                </a:solidFill>
-                <a:effectLst/>
-                <a:latin typeface="+mn-lt"/>
-                <a:ea typeface="+mn-ea"/>
-                <a:cs typeface="+mn-cs"/>
-              </a:rPr>
-              <a:t> </a:t>
-            </a:r>
-            <a:r>
-              <a:rPr lang="en-CA" sz="1200" kern="1200" dirty="0" err="1">
-                <a:solidFill>
-                  <a:schemeClr val="tx1"/>
-                </a:solidFill>
-                <a:effectLst/>
-                <a:latin typeface="+mn-lt"/>
-                <a:ea typeface="+mn-ea"/>
-                <a:cs typeface="+mn-cs"/>
-              </a:rPr>
-              <a:t>Posfai</a:t>
-            </a:r>
-            <a:r>
-              <a:rPr lang="en-CA" sz="1200" kern="1200" dirty="0">
-                <a:solidFill>
-                  <a:schemeClr val="tx1"/>
-                </a:solidFill>
-                <a:effectLst/>
-                <a:latin typeface="+mn-lt"/>
-                <a:ea typeface="+mn-ea"/>
-                <a:cs typeface="+mn-cs"/>
-              </a:rPr>
-              <a:t>, and Gabor </a:t>
-            </a:r>
-            <a:r>
-              <a:rPr lang="en-CA" sz="1200" kern="1200" dirty="0" err="1">
-                <a:solidFill>
-                  <a:schemeClr val="tx1"/>
-                </a:solidFill>
-                <a:effectLst/>
-                <a:latin typeface="+mn-lt"/>
-                <a:ea typeface="+mn-ea"/>
-                <a:cs typeface="+mn-cs"/>
-              </a:rPr>
-              <a:t>Vattay</a:t>
-            </a:r>
-            <a:r>
-              <a:rPr lang="en-CA" sz="1200" kern="1200" dirty="0">
-                <a:solidFill>
-                  <a:schemeClr val="tx1"/>
-                </a:solidFill>
-                <a:effectLst/>
-                <a:latin typeface="+mn-lt"/>
-                <a:ea typeface="+mn-ea"/>
-                <a:cs typeface="+mn-cs"/>
-              </a:rPr>
-              <a:t>.</a:t>
-            </a:r>
-            <a:endParaRPr lang="en-US" sz="1200" kern="1200" dirty="0">
-              <a:solidFill>
-                <a:schemeClr val="tx1"/>
-              </a:solidFill>
-              <a:effectLst/>
-              <a:latin typeface="+mn-lt"/>
-              <a:ea typeface="+mn-ea"/>
-              <a:cs typeface="+mn-cs"/>
-            </a:endParaRPr>
-          </a:p>
-          <a:p>
             <a:endParaRPr lang="en-US" dirty="0"/>
           </a:p>
         </p:txBody>
@@ -964,6 +804,10 @@
           <a:bodyPr/>
           <a:lstStyle/>
           <a:p>
+            <a:pPr marL="171450" indent="-171450">
+              <a:buFontTx/>
+              <a:buChar char="-"/>
+            </a:pPr>
             <a:r>
               <a:rPr lang="en-CA" sz="1200" kern="1200" dirty="0">
                 <a:solidFill>
@@ -974,10 +818,16 @@
                 <a:ea typeface="+mn-ea"/>
                 <a:cs typeface="+mn-cs"/>
               </a:rPr>
-              <a:t>They then analyze the constructed matrix using Principal Component Analysis. Principal Component Analysis is a dimensionality reduction technique that is currently implemented in Spark </a:t>
-            </a:r>
-            <a:r>
-              <a:rPr lang="en-CA" sz="1200" kern="1200" dirty="0" err="1">
+              <a:t>The matrix was analyzed using Principal Component Analysis</a:t>
+            </a:r>
+          </a:p>
+          <a:p>
+            <a:pPr marL="171450" indent="-171450">
+              <a:buFontTx/>
+              <a:buChar char="-"/>
+            </a:pPr>
+            <a:r>
+              <a:rPr lang="en-CA" sz="1200" kern="1200" dirty="0">
                 <a:solidFill>
                   <a:schemeClr val="tx1"/>
                 </a:solidFill>
@@ -986,8 +836,14 @@
                 <a:ea typeface="+mn-ea"/>
                 <a:cs typeface="+mn-cs"/>
               </a:rPr>
-              <a:t>MLlib</a:t>
-            </a:r>
+              <a:t>PCA is a dimensionality reduction technique</a:t>
+            </a:r>
+          </a:p>
+          <a:p>
+            <a:pPr marL="171450" indent="-171450">
+              <a:buFontTx/>
+              <a:buChar char="-"/>
+            </a:pPr>
             <a:r>
               <a:rPr lang="en-CA" sz="1200" kern="1200" dirty="0">
                 <a:solidFill>
@@ -998,9 +854,123 @@
                 <a:ea typeface="+mn-ea"/>
                 <a:cs typeface="+mn-cs"/>
               </a:rPr>
-              <a:t>. The purpose of this technique is to extract the most important information from the given data set. This is done by finding new features that can accurately explain the variance in the data set. By doing so, we can compress the size of the data set by keeping only the important features. The first basis vector will explain as much variance as possible and each subsequent basis vector will explain as much of the variance left as possible. It explains the variance by creating new features that are linear combinations of the existing features. For example, in this data set, the basis vector will be along the center of these data points since variance is maximized in this direction. Here the new basis vector is linear combination of both x and y.</a:t>
-            </a:r>
-            <a:endParaRPr lang="en-US" sz="1200" kern="1200" dirty="0">
+              <a:t>The purpose of this technique is to extract the most important information from the given data set. </a:t>
+            </a:r>
+          </a:p>
+          <a:p>
+            <a:pPr marL="171450" indent="-171450">
+              <a:buFontTx/>
+              <a:buChar char="-"/>
+            </a:pPr>
+            <a:r>
+              <a:rPr lang="en-CA" sz="1200" kern="1200" dirty="0">
+                <a:solidFill>
+                  <a:schemeClr val="tx1"/>
+                </a:solidFill>
+                <a:effectLst/>
+                <a:latin typeface="+mn-lt"/>
+                <a:ea typeface="+mn-ea"/>
+                <a:cs typeface="+mn-cs"/>
+              </a:rPr>
+              <a:t>This is done by finding new features that are linear combinations of existing features that can accurately explain the variance in the data set</a:t>
+            </a:r>
+          </a:p>
+          <a:p>
+            <a:pPr marL="171450" indent="-171450">
+              <a:buFontTx/>
+              <a:buChar char="-"/>
+            </a:pPr>
+            <a:r>
+              <a:rPr lang="en-CA" sz="1200" kern="1200" dirty="0">
+                <a:solidFill>
+                  <a:schemeClr val="tx1"/>
+                </a:solidFill>
+                <a:effectLst/>
+                <a:latin typeface="+mn-lt"/>
+                <a:ea typeface="+mn-ea"/>
+                <a:cs typeface="+mn-cs"/>
+              </a:rPr>
+              <a:t>By doing this, we can compress the size of the data set by keeping only the important features</a:t>
+            </a:r>
+          </a:p>
+          <a:p>
+            <a:pPr marL="171450" indent="-171450">
+              <a:buFontTx/>
+              <a:buChar char="-"/>
+            </a:pPr>
+            <a:r>
+              <a:rPr lang="en-CA" sz="1200" kern="1200" dirty="0">
+                <a:solidFill>
+                  <a:schemeClr val="tx1"/>
+                </a:solidFill>
+                <a:effectLst/>
+                <a:latin typeface="+mn-lt"/>
+                <a:ea typeface="+mn-ea"/>
+                <a:cs typeface="+mn-cs"/>
+              </a:rPr>
+              <a:t>The first basis vector will explain as much variance as possible and each subsequent basis vector will explain as much variance left as possible.</a:t>
+            </a:r>
+          </a:p>
+          <a:p>
+            <a:pPr marL="171450" indent="-171450">
+              <a:buFontTx/>
+              <a:buChar char="-"/>
+            </a:pPr>
+            <a:r>
+              <a:rPr lang="en-CA" sz="1200" kern="1200" dirty="0">
+                <a:solidFill>
+                  <a:schemeClr val="tx1"/>
+                </a:solidFill>
+                <a:effectLst/>
+                <a:latin typeface="+mn-lt"/>
+                <a:ea typeface="+mn-ea"/>
+                <a:cs typeface="+mn-cs"/>
+              </a:rPr>
+              <a:t>For example, in this data set,</a:t>
+            </a:r>
+          </a:p>
+          <a:p>
+            <a:pPr marL="628650" lvl="1" indent="-171450">
+              <a:buFontTx/>
+              <a:buChar char="-"/>
+            </a:pPr>
+            <a:r>
+              <a:rPr lang="en-CA" sz="1200" kern="1200" dirty="0">
+                <a:solidFill>
+                  <a:schemeClr val="tx1"/>
+                </a:solidFill>
+                <a:effectLst/>
+                <a:latin typeface="+mn-lt"/>
+                <a:ea typeface="+mn-ea"/>
+                <a:cs typeface="+mn-cs"/>
+              </a:rPr>
+              <a:t>The basis vector will be along the center of the data points since variance is maximized in this direction. </a:t>
+            </a:r>
+          </a:p>
+          <a:p>
+            <a:pPr marL="628650" lvl="1" indent="-171450">
+              <a:buFontTx/>
+              <a:buChar char="-"/>
+            </a:pPr>
+            <a:r>
+              <a:rPr lang="en-CA" sz="1200" kern="1200" dirty="0">
+                <a:solidFill>
+                  <a:schemeClr val="tx1"/>
+                </a:solidFill>
+                <a:effectLst/>
+                <a:latin typeface="+mn-lt"/>
+                <a:ea typeface="+mn-ea"/>
+                <a:cs typeface="+mn-cs"/>
+              </a:rPr>
+              <a:t>Here the basis vector is a linear combination of both x and y</a:t>
+            </a:r>
+          </a:p>
+          <a:p>
+            <a:pPr marL="457200" lvl="1" indent="0">
+              <a:buFontTx/>
+              <a:buNone/>
+            </a:pPr>
+            <a:endParaRPr lang="en-CA" sz="1200" kern="1200" dirty="0">
               <a:solidFill>
                 <a:schemeClr val="tx1"/>
               </a:solidFill>
@@ -1011,6 +981,53 @@
             </a:endParaRPr>
           </a:p>
           <a:p>
+            <a:pPr marL="457200" lvl="1" indent="0">
+              <a:buFontTx/>
+              <a:buNone/>
+            </a:pPr>
+            <a:endParaRPr lang="en-CA" sz="1200" kern="1200" dirty="0">
+              <a:solidFill>
+                <a:schemeClr val="tx1"/>
+              </a:solidFill>
+              <a:effectLst/>
+              <a:latin typeface="+mn-lt"/>
+              <a:ea typeface="+mn-ea"/>
+              <a:cs typeface="+mn-cs"/>
+            </a:endParaRPr>
+          </a:p>
+          <a:p>
+            <a:pPr marL="457200" lvl="1" indent="0">
+              <a:buFontTx/>
+              <a:buNone/>
+            </a:pPr>
+            <a:endParaRPr lang="en-CA" sz="1200" kern="1200" dirty="0">
+              <a:solidFill>
+                <a:schemeClr val="tx1"/>
+              </a:solidFill>
+              <a:effectLst/>
+              <a:latin typeface="+mn-lt"/>
+              <a:ea typeface="+mn-ea"/>
+              <a:cs typeface="+mn-cs"/>
+            </a:endParaRPr>
+          </a:p>
+          <a:p>
+            <a:pPr marL="0" marR="0" lvl="0" indent="0" algn="l" defTabSz="914400" rtl="0" eaLnBrk="1" fontAlgn="auto" latinLnBrk="0" hangingPunct="1">
+              <a:lnSpc>
+                <a:spcPct val="100000"/>
+              </a:lnSpc>
+              <a:spcBef>
+                <a:spcPts val="0"/>
+              </a:spcBef>
+              <a:spcAft>
+                <a:spcPts val="0"/>
+              </a:spcAft>
+              <a:buClrTx/>
+              <a:buSzTx/>
+              <a:buFont typeface="Arial" panose="020B0604020202020204" pitchFamily="34" charset="0"/>
+              <a:buNone/>
+              <a:tabLst/>
+              <a:defRPr/>
+            </a:pPr>
             <a:r>
               <a:rPr lang="en-CA" sz="1200" kern="1200" dirty="0">
                 <a:solidFill>
@@ -1122,7 +1139,7 @@
           <a:bodyPr/>
           <a:lstStyle/>
           <a:p>
-            <a:pPr marL="0" marR="0" lvl="0" indent="0" algn="l" defTabSz="914400" rtl="0" eaLnBrk="1" fontAlgn="auto" latinLnBrk="0" hangingPunct="1">
+            <a:pPr marL="171450" marR="0" lvl="0" indent="-171450" algn="l" defTabSz="914400" rtl="0" eaLnBrk="1" fontAlgn="auto" latinLnBrk="0" hangingPunct="1">
               <a:lnSpc>
                 <a:spcPct val="100000"/>
               </a:lnSpc>
@@ -1134,8 +1151,8 @@
               </a:spcAft>
               <a:buClrTx/>
               <a:buSzTx/>
-              <a:buFont typeface="Arial" panose="020B0604020202020204" pitchFamily="34" charset="0"/>
-              <a:buNone/>
+              <a:buFontTx/>
+              <a:buChar char="-"/>
               <a:tabLst/>
               <a:defRPr/>
             </a:pPr>
@@ -1149,23 +1166,101 @@
                 <a:ea typeface="+mn-ea"/>
                 <a:cs typeface="+mn-cs"/>
               </a:rPr>
-              <a:t>The key result from their paper was they found a correspondence between the exchange rate time series and the LT core. To calculate the price, they first subtracted the average value of the price time series, and estimated this as a linear combination of singular vectors. They could approximate the exchange rate using both the first four base vectors ranked by variance explained, and the first four base vectors ranked by correlation to the price.</a:t>
-            </a:r>
-            <a:endParaRPr lang="en-US" sz="1200" kern="1200" dirty="0">
-              <a:solidFill>
-                <a:schemeClr val="tx1"/>
-              </a:solidFill>
-              <a:effectLst/>
-              <a:latin typeface="+mn-lt"/>
-              <a:ea typeface="+mn-ea"/>
-              <a:cs typeface="+mn-cs"/>
-            </a:endParaRPr>
-          </a:p>
-          <a:p>
-            <a:pPr marL="0" indent="0">
-              <a:buFont typeface="Arial" panose="020B0604020202020204" pitchFamily="34" charset="0"/>
-              <a:buNone/>
+              <a:t>This is the key result they discovered through their analysis</a:t>
+            </a:r>
+          </a:p>
+          <a:p>
+            <a:pPr marL="171450" marR="0" lvl="0" indent="-171450" algn="l" defTabSz="914400" rtl="0" eaLnBrk="1" fontAlgn="auto" latinLnBrk="0" hangingPunct="1">
+              <a:lnSpc>
+                <a:spcPct val="100000"/>
+              </a:lnSpc>
+              <a:spcBef>
+                <a:spcPts val="0"/>
+              </a:spcBef>
+              <a:spcAft>
+                <a:spcPts val="0"/>
+              </a:spcAft>
+              <a:buClrTx/>
+              <a:buSzTx/>
+              <a:buFontTx/>
+              <a:buChar char="-"/>
+              <a:tabLst/>
+              <a:defRPr/>
             </a:pPr>
+            <a:r>
+              <a:rPr lang="en-CA" sz="1200" kern="1200" dirty="0">
+                <a:solidFill>
+                  <a:schemeClr val="tx1"/>
+                </a:solidFill>
+                <a:effectLst/>
+                <a:latin typeface="+mn-lt"/>
+                <a:ea typeface="+mn-ea"/>
+                <a:cs typeface="+mn-cs"/>
+              </a:rPr>
+              <a:t>They found a correspondence between the exchange rate time series and the LT core</a:t>
+            </a:r>
+          </a:p>
+          <a:p>
+            <a:pPr marL="171450" marR="0" lvl="0" indent="-171450" algn="l" defTabSz="914400" rtl="0" eaLnBrk="1" fontAlgn="auto" latinLnBrk="0" hangingPunct="1">
+              <a:lnSpc>
+                <a:spcPct val="100000"/>
+              </a:lnSpc>
+              <a:spcBef>
+                <a:spcPts val="0"/>
+              </a:spcBef>
+              <a:spcAft>
+                <a:spcPts val="0"/>
+              </a:spcAft>
+              <a:buClrTx/>
+              <a:buSzTx/>
+              <a:buFontTx/>
+              <a:buChar char="-"/>
+              <a:tabLst/>
+              <a:defRPr/>
+            </a:pPr>
+            <a:r>
+              <a:rPr lang="en-CA" sz="1200" kern="1200" dirty="0">
+                <a:solidFill>
+                  <a:schemeClr val="tx1"/>
+                </a:solidFill>
+                <a:effectLst/>
+                <a:latin typeface="+mn-lt"/>
+                <a:ea typeface="+mn-ea"/>
+                <a:cs typeface="+mn-cs"/>
+              </a:rPr>
+              <a:t>To calculate the price, they first subtracted the average price from the time series, and estimated this a linear combination of singular vectors.</a:t>
+            </a:r>
+          </a:p>
+          <a:p>
+            <a:pPr marL="171450" marR="0" lvl="0" indent="-171450" algn="l" defTabSz="914400" rtl="0" eaLnBrk="1" fontAlgn="auto" latinLnBrk="0" hangingPunct="1">
+              <a:lnSpc>
+                <a:spcPct val="100000"/>
+              </a:lnSpc>
+              <a:spcBef>
+                <a:spcPts val="0"/>
+              </a:spcBef>
+              <a:spcAft>
+                <a:spcPts val="0"/>
+              </a:spcAft>
+              <a:buClrTx/>
+              <a:buSzTx/>
+              <a:buFontTx/>
+              <a:buChar char="-"/>
+              <a:tabLst/>
+              <a:defRPr/>
+            </a:pPr>
+            <a:r>
+              <a:rPr lang="en-CA" sz="1200" kern="1200" dirty="0">
+                <a:solidFill>
+                  <a:schemeClr val="tx1"/>
+                </a:solidFill>
+                <a:effectLst/>
+                <a:latin typeface="+mn-lt"/>
+                <a:ea typeface="+mn-ea"/>
+                <a:cs typeface="+mn-cs"/>
+              </a:rPr>
+              <a:t>They could approximate the exchange rate using both the first four base vectors ranked by variance explained, and by the first four base vector ranked by correlation to price.</a:t>
+            </a:r>
             <a:endParaRPr lang="en-CA" dirty="0"/>
           </a:p>
         </p:txBody>
@@ -1250,7 +1345,7 @@
           <a:bodyPr/>
           <a:lstStyle/>
           <a:p>
-            <a:pPr marL="0" marR="0" lvl="0" indent="0" algn="l" defTabSz="914400" rtl="0" eaLnBrk="1" fontAlgn="auto" latinLnBrk="0" hangingPunct="1">
+            <a:pPr marL="171450" marR="0" lvl="0" indent="-171450" algn="l" defTabSz="914400" rtl="0" eaLnBrk="1" fontAlgn="auto" latinLnBrk="0" hangingPunct="1">
               <a:lnSpc>
                 <a:spcPct val="100000"/>
               </a:lnSpc>
@@ -1262,8 +1357,39 @@
               </a:spcAft>
               <a:buClrTx/>
               <a:buSzTx/>
-              <a:buFont typeface="Arial" panose="020B0604020202020204" pitchFamily="34" charset="0"/>
-              <a:buNone/>
+              <a:buFontTx/>
+              <a:buChar char="-"/>
+              <a:tabLst/>
+              <a:defRPr/>
+            </a:pPr>
+            <a:r>
+              <a:rPr lang="en-CA" sz="1200" kern="1200" dirty="0">
+                <a:solidFill>
+                  <a:schemeClr val="tx1"/>
+                </a:solidFill>
+                <a:effectLst/>
+                <a:latin typeface="+mn-lt"/>
+                <a:ea typeface="+mn-ea"/>
+                <a:cs typeface="+mn-cs"/>
+              </a:rPr>
+              <a:t>Now to relate this back to my project for this course</a:t>
+            </a:r>
+          </a:p>
+          <a:p>
+            <a:pPr marL="171450" marR="0" lvl="0" indent="-171450" algn="l" defTabSz="914400" rtl="0" eaLnBrk="1" fontAlgn="auto" latinLnBrk="0" hangingPunct="1">
+              <a:lnSpc>
+                <a:spcPct val="100000"/>
+              </a:lnSpc>
+              <a:spcBef>
+                <a:spcPts val="0"/>
+              </a:spcBef>
+              <a:spcAft>
+                <a:spcPts val="0"/>
+              </a:spcAft>
+              <a:buClrTx/>
+              <a:buSzTx/>
+              <a:buFontTx/>
+              <a:buChar char="-"/>
               <a:tabLst/>
               <a:defRPr/>
             </a:pPr>
@@ -1301,7 +1427,38 @@
                 <a:ea typeface="+mn-ea"/>
                 <a:cs typeface="+mn-cs"/>
               </a:rPr>
-              <a:t> network is like the Bitcoin network and has the same information in terms of transactions. The same research question can be answered but in terms of the </a:t>
+              <a:t> network is very similar to the Bitcoin network that I described earlier. It has the same information in terms of transactions.</a:t>
+            </a:r>
+          </a:p>
+          <a:p>
+            <a:pPr marL="171450" marR="0" lvl="0" indent="-171450" algn="l" defTabSz="914400" rtl="0" eaLnBrk="1" fontAlgn="auto" latinLnBrk="0" hangingPunct="1">
+              <a:lnSpc>
+                <a:spcPct val="100000"/>
+              </a:lnSpc>
+              <a:spcBef>
+                <a:spcPts val="0"/>
+              </a:spcBef>
+              <a:spcAft>
+                <a:spcPts val="0"/>
+              </a:spcAft>
+              <a:buClrTx/>
+              <a:buSzTx/>
+              <a:buFontTx/>
+              <a:buChar char="-"/>
+              <a:tabLst/>
+              <a:defRPr/>
+            </a:pPr>
+            <a:r>
+              <a:rPr lang="en-CA" sz="1200" kern="1200" dirty="0">
+                <a:solidFill>
+                  <a:schemeClr val="tx1"/>
+                </a:solidFill>
+                <a:effectLst/>
+                <a:latin typeface="+mn-lt"/>
+                <a:ea typeface="+mn-ea"/>
+                <a:cs typeface="+mn-cs"/>
+              </a:rPr>
+              <a:t>The same research question could be answered but in terms of the </a:t>
             </a:r>
             <a:r>
               <a:rPr lang="en-CA" sz="1200" kern="1200" dirty="0" err="1">
@@ -1325,7 +1482,69 @@
                 <a:ea typeface="+mn-ea"/>
                 <a:cs typeface="+mn-cs"/>
               </a:rPr>
-              <a:t> network. Daily snapshot vectors can be constructed and concatenated into a matrix. Then PCA can be performed to identify the key features of the network. Then the same method could be used to see if the network structure can be related the </a:t>
+              <a:t> network</a:t>
+            </a:r>
+          </a:p>
+          <a:p>
+            <a:pPr marL="171450" marR="0" lvl="0" indent="-171450" algn="l" defTabSz="914400" rtl="0" eaLnBrk="1" fontAlgn="auto" latinLnBrk="0" hangingPunct="1">
+              <a:lnSpc>
+                <a:spcPct val="100000"/>
+              </a:lnSpc>
+              <a:spcBef>
+                <a:spcPts val="0"/>
+              </a:spcBef>
+              <a:spcAft>
+                <a:spcPts val="0"/>
+              </a:spcAft>
+              <a:buClrTx/>
+              <a:buSzTx/>
+              <a:buFontTx/>
+              <a:buChar char="-"/>
+              <a:tabLst/>
+              <a:defRPr/>
+            </a:pPr>
+            <a:r>
+              <a:rPr lang="en-CA" sz="1200" kern="1200" dirty="0">
+                <a:solidFill>
+                  <a:schemeClr val="tx1"/>
+                </a:solidFill>
+                <a:effectLst/>
+                <a:latin typeface="+mn-lt"/>
+                <a:ea typeface="+mn-ea"/>
+                <a:cs typeface="+mn-cs"/>
+              </a:rPr>
+              <a:t>PCA can be done to identify the key features involved in the network structure changing</a:t>
+            </a:r>
+          </a:p>
+          <a:p>
+            <a:pPr marL="171450" marR="0" lvl="0" indent="-171450" algn="l" defTabSz="914400" rtl="0" eaLnBrk="1" fontAlgn="auto" latinLnBrk="0" hangingPunct="1">
+              <a:lnSpc>
+                <a:spcPct val="100000"/>
+              </a:lnSpc>
+              <a:spcBef>
+                <a:spcPts val="0"/>
+              </a:spcBef>
+              <a:spcAft>
+                <a:spcPts val="0"/>
+              </a:spcAft>
+              <a:buClrTx/>
+              <a:buSzTx/>
+              <a:buFontTx/>
+              <a:buChar char="-"/>
+              <a:tabLst/>
+              <a:defRPr/>
+            </a:pPr>
+            <a:r>
+              <a:rPr lang="en-CA" sz="1200" kern="1200" dirty="0">
+                <a:solidFill>
+                  <a:schemeClr val="tx1"/>
+                </a:solidFill>
+                <a:effectLst/>
+                <a:latin typeface="+mn-lt"/>
+                <a:ea typeface="+mn-ea"/>
+                <a:cs typeface="+mn-cs"/>
+              </a:rPr>
+              <a:t>The network structure can also be compared to the </a:t>
             </a:r>
             <a:r>
               <a:rPr lang="en-CA" sz="1200" kern="1200" dirty="0" err="1">
@@ -1349,7 +1568,7 @@
                 <a:ea typeface="+mn-ea"/>
                 <a:cs typeface="+mn-cs"/>
               </a:rPr>
-              <a:t> exchange rate. </a:t>
+              <a:t> exchange rate to see if there is any correlation.</a:t>
             </a:r>
             <a:endParaRPr lang="en-US" sz="1200" kern="1200" dirty="0">
               <a:solidFill>
@@ -1615,7 +1834,74 @@
           <a:bodyPr/>
           <a:lstStyle/>
           <a:p>
-            <a:endParaRPr lang="en-CA" dirty="0"/>
+            <a:pPr marL="171450" indent="-171450">
+              <a:buFontTx/>
+              <a:buChar char="-"/>
+            </a:pPr>
+            <a:r>
+              <a:rPr lang="en-CA" dirty="0"/>
+              <a:t>Overview of paper</a:t>
+            </a:r>
+          </a:p>
+          <a:p>
+            <a:pPr marL="171450" indent="-171450">
+              <a:buFontTx/>
+              <a:buChar char="-"/>
+            </a:pPr>
+            <a:r>
+              <a:rPr lang="en-CA" dirty="0"/>
+              <a:t>Background information</a:t>
+            </a:r>
+          </a:p>
+          <a:p>
+            <a:pPr marL="171450" indent="-171450">
+              <a:buFontTx/>
+              <a:buChar char="-"/>
+            </a:pPr>
+            <a:r>
+              <a:rPr lang="en-CA" dirty="0"/>
+              <a:t>Where they got there data, </a:t>
+            </a:r>
+          </a:p>
+          <a:p>
+            <a:pPr marL="171450" indent="-171450">
+              <a:buFontTx/>
+              <a:buChar char="-"/>
+            </a:pPr>
+            <a:r>
+              <a:rPr lang="en-CA" dirty="0"/>
+              <a:t>how’d they prepare their data for analysis</a:t>
+            </a:r>
+          </a:p>
+          <a:p>
+            <a:pPr marL="171450" indent="-171450">
+              <a:buFontTx/>
+              <a:buChar char="-"/>
+            </a:pPr>
+            <a:r>
+              <a:rPr lang="en-CA" dirty="0"/>
+              <a:t>how the analyzed their data</a:t>
+            </a:r>
+          </a:p>
+          <a:p>
+            <a:pPr marL="171450" indent="-171450">
+              <a:buFontTx/>
+              <a:buChar char="-"/>
+            </a:pPr>
+            <a:r>
+              <a:rPr lang="en-CA" dirty="0"/>
+              <a:t>Key results</a:t>
+            </a:r>
+          </a:p>
+          <a:p>
+            <a:pPr marL="171450" indent="-171450">
+              <a:buFontTx/>
+              <a:buChar char="-"/>
+            </a:pPr>
+            <a:r>
+              <a:rPr lang="en-CA" dirty="0"/>
+              <a:t>And the relationship to my research project for this course</a:t>
+            </a:r>
           </a:p>
         </p:txBody>
       </p:sp>
@@ -1699,7 +1985,7 @@
           <a:bodyPr/>
           <a:lstStyle/>
           <a:p>
-            <a:pPr marL="0" marR="0" lvl="0" indent="0" algn="l" defTabSz="914400" rtl="0" eaLnBrk="1" fontAlgn="auto" latinLnBrk="0" hangingPunct="1">
+            <a:pPr marL="171450" marR="0" lvl="0" indent="-171450" algn="l" defTabSz="914400" rtl="0" eaLnBrk="1" fontAlgn="auto" latinLnBrk="0" hangingPunct="1">
               <a:lnSpc>
                 <a:spcPct val="100000"/>
               </a:lnSpc>
@@ -1711,8 +1997,8 @@
               </a:spcAft>
               <a:buClrTx/>
               <a:buSzTx/>
-              <a:buFont typeface="Arial" panose="020B0604020202020204" pitchFamily="34" charset="0"/>
-              <a:buNone/>
+              <a:buFontTx/>
+              <a:buChar char="-"/>
               <a:tabLst/>
               <a:defRPr/>
             </a:pPr>
@@ -1726,23 +2012,101 @@
                 <a:ea typeface="+mn-ea"/>
                 <a:cs typeface="+mn-cs"/>
               </a:rPr>
-              <a:t>The main research question this paper attempts to solve is “aim to identify relevant changes in network structure over time and to uncover the relation of network structure and macroeconomic indicators of the system”. Their main data source is Bitcoin’s public transaction network. They used principal component analysis to identify important features in the variation of the network over time.</a:t>
-            </a:r>
-            <a:endParaRPr lang="en-US" sz="1200" kern="1200" dirty="0">
-              <a:solidFill>
-                <a:schemeClr val="tx1"/>
-              </a:solidFill>
-              <a:effectLst/>
-              <a:latin typeface="+mn-lt"/>
-              <a:ea typeface="+mn-ea"/>
-              <a:cs typeface="+mn-cs"/>
-            </a:endParaRPr>
-          </a:p>
-          <a:p>
-            <a:pPr marL="0" indent="0">
-              <a:buFont typeface="Arial" panose="020B0604020202020204" pitchFamily="34" charset="0"/>
-              <a:buNone/>
+              <a:t>The main research question this paper attempts to answer..</a:t>
+            </a:r>
+          </a:p>
+          <a:p>
+            <a:pPr marL="171450" marR="0" lvl="0" indent="-171450" algn="l" defTabSz="914400" rtl="0" eaLnBrk="1" fontAlgn="auto" latinLnBrk="0" hangingPunct="1">
+              <a:lnSpc>
+                <a:spcPct val="100000"/>
+              </a:lnSpc>
+              <a:spcBef>
+                <a:spcPts val="0"/>
+              </a:spcBef>
+              <a:spcAft>
+                <a:spcPts val="0"/>
+              </a:spcAft>
+              <a:buClrTx/>
+              <a:buSzTx/>
+              <a:buFontTx/>
+              <a:buChar char="-"/>
+              <a:tabLst/>
+              <a:defRPr/>
             </a:pPr>
+            <a:r>
+              <a:rPr lang="en-CA" sz="1200" kern="1200" dirty="0">
+                <a:solidFill>
+                  <a:schemeClr val="tx1"/>
+                </a:solidFill>
+                <a:effectLst/>
+                <a:latin typeface="+mn-lt"/>
+                <a:ea typeface="+mn-ea"/>
+                <a:cs typeface="+mn-cs"/>
+              </a:rPr>
+              <a:t>They answer this question by using Bitcoin’s transaction network </a:t>
+            </a:r>
+          </a:p>
+          <a:p>
+            <a:pPr marL="171450" marR="0" lvl="0" indent="-171450" algn="l" defTabSz="914400" rtl="0" eaLnBrk="1" fontAlgn="auto" latinLnBrk="0" hangingPunct="1">
+              <a:lnSpc>
+                <a:spcPct val="100000"/>
+              </a:lnSpc>
+              <a:spcBef>
+                <a:spcPts val="0"/>
+              </a:spcBef>
+              <a:spcAft>
+                <a:spcPts val="0"/>
+              </a:spcAft>
+              <a:buClrTx/>
+              <a:buSzTx/>
+              <a:buFontTx/>
+              <a:buChar char="-"/>
+              <a:tabLst/>
+              <a:defRPr/>
+            </a:pPr>
+            <a:r>
+              <a:rPr lang="en-CA" sz="1200" kern="1200" dirty="0">
+                <a:solidFill>
+                  <a:schemeClr val="tx1"/>
+                </a:solidFill>
+                <a:effectLst/>
+                <a:latin typeface="+mn-lt"/>
+                <a:ea typeface="+mn-ea"/>
+                <a:cs typeface="+mn-cs"/>
+              </a:rPr>
+              <a:t>To perform unsupervised identification of important features in the network variation over time</a:t>
+            </a:r>
+          </a:p>
+          <a:p>
+            <a:pPr marL="171450" marR="0" lvl="0" indent="-171450" algn="l" defTabSz="914400" rtl="0" eaLnBrk="1" fontAlgn="auto" latinLnBrk="0" hangingPunct="1">
+              <a:lnSpc>
+                <a:spcPct val="100000"/>
+              </a:lnSpc>
+              <a:spcBef>
+                <a:spcPts val="0"/>
+              </a:spcBef>
+              <a:spcAft>
+                <a:spcPts val="0"/>
+              </a:spcAft>
+              <a:buClrTx/>
+              <a:buSzTx/>
+              <a:buFontTx/>
+              <a:buChar char="-"/>
+              <a:tabLst/>
+              <a:defRPr/>
+            </a:pPr>
+            <a:r>
+              <a:rPr lang="en-CA" sz="1200" kern="1200" dirty="0">
+                <a:solidFill>
+                  <a:schemeClr val="tx1"/>
+                </a:solidFill>
+                <a:effectLst/>
+                <a:latin typeface="+mn-lt"/>
+                <a:ea typeface="+mn-ea"/>
+                <a:cs typeface="+mn-cs"/>
+              </a:rPr>
+              <a:t>The main analysis method that they use to analyze their data is..</a:t>
+            </a:r>
             <a:endParaRPr lang="en-CA" dirty="0"/>
           </a:p>
         </p:txBody>
@@ -1827,7 +2191,7 @@
           <a:bodyPr/>
           <a:lstStyle/>
           <a:p>
-            <a:pPr marL="0" marR="0" lvl="0" indent="0" algn="l" defTabSz="914400" rtl="0" eaLnBrk="1" fontAlgn="auto" latinLnBrk="0" hangingPunct="1">
+            <a:pPr marL="171450" marR="0" lvl="0" indent="-171450" algn="l" defTabSz="914400" rtl="0" eaLnBrk="1" fontAlgn="auto" latinLnBrk="0" hangingPunct="1">
               <a:lnSpc>
                 <a:spcPct val="100000"/>
               </a:lnSpc>
@@ -1839,8 +2203,8 @@
               </a:spcAft>
               <a:buClrTx/>
               <a:buSzTx/>
-              <a:buFont typeface="Arial" panose="020B0604020202020204" pitchFamily="34" charset="0"/>
-              <a:buNone/>
+              <a:buFontTx/>
+              <a:buChar char="-"/>
               <a:tabLst/>
               <a:defRPr/>
             </a:pPr>
@@ -1854,23 +2218,473 @@
                 <a:ea typeface="+mn-ea"/>
                 <a:cs typeface="+mn-cs"/>
               </a:rPr>
-              <a:t>Bitcoin is a form of cryptocurrency that is created and held electronically. It is decentralized as no one controls it. Every machine that mines Bitcoin make up the network so no one person has power over the network. This currency isn’t printed and is produced by people and computers around the world solving mathematical problems.  Bitcoin is a finite currency. There are only a finite number of Bitcoins available, 21 million to be exact, so people can’t produce more Bitcoins to de-value the currency. Bitcoins are produced via “mining” using computational power in a distributed network. “Miners” are rewarded for the “mining” blocks. The reward however halves every 210,000 blocks. About 77% of the total blocks have been mined and the current reward is 12 Bitcoins per block. This network of “miners” also process transactions made with Bitcoin, making it a standalone payment network. Bitcoin stores details of every single transaction that ever happened on the network in a general ledger in the form of a blockchain. Everyone knows how much bitcoins are stored at a given address. Users can use multiple addresses to protect their identity. </a:t>
-            </a:r>
-            <a:endParaRPr lang="en-US" sz="1200" kern="1200" dirty="0">
-              <a:solidFill>
-                <a:schemeClr val="tx1"/>
-              </a:solidFill>
-              <a:effectLst/>
-              <a:latin typeface="+mn-lt"/>
-              <a:ea typeface="+mn-ea"/>
-              <a:cs typeface="+mn-cs"/>
-            </a:endParaRPr>
-          </a:p>
-          <a:p>
-            <a:pPr marL="0" indent="0">
-              <a:buFont typeface="Arial" panose="020B0604020202020204" pitchFamily="34" charset="0"/>
-              <a:buNone/>
+              <a:t>Now I will provide some background on the Bitcoin currency.</a:t>
+            </a:r>
+          </a:p>
+          <a:p>
+            <a:pPr marL="171450" marR="0" lvl="0" indent="-171450" algn="l" defTabSz="914400" rtl="0" eaLnBrk="1" fontAlgn="auto" latinLnBrk="0" hangingPunct="1">
+              <a:lnSpc>
+                <a:spcPct val="100000"/>
+              </a:lnSpc>
+              <a:spcBef>
+                <a:spcPts val="0"/>
+              </a:spcBef>
+              <a:spcAft>
+                <a:spcPts val="0"/>
+              </a:spcAft>
+              <a:buClrTx/>
+              <a:buSzTx/>
+              <a:buFontTx/>
+              <a:buChar char="-"/>
+              <a:tabLst/>
+              <a:defRPr/>
             </a:pPr>
+            <a:r>
+              <a:rPr lang="en-CA" sz="1200" kern="1200" dirty="0">
+                <a:solidFill>
+                  <a:schemeClr val="tx1"/>
+                </a:solidFill>
+                <a:effectLst/>
+                <a:latin typeface="+mn-lt"/>
+                <a:ea typeface="+mn-ea"/>
+                <a:cs typeface="+mn-cs"/>
+              </a:rPr>
+              <a:t>Form of cryptocurrency that is created and held electronically</a:t>
+            </a:r>
+          </a:p>
+          <a:p>
+            <a:pPr marL="171450" marR="0" lvl="0" indent="-171450" algn="l" defTabSz="914400" rtl="0" eaLnBrk="1" fontAlgn="auto" latinLnBrk="0" hangingPunct="1">
+              <a:lnSpc>
+                <a:spcPct val="100000"/>
+              </a:lnSpc>
+              <a:spcBef>
+                <a:spcPts val="0"/>
+              </a:spcBef>
+              <a:spcAft>
+                <a:spcPts val="0"/>
+              </a:spcAft>
+              <a:buClrTx/>
+              <a:buSzTx/>
+              <a:buFontTx/>
+              <a:buChar char="-"/>
+              <a:tabLst/>
+              <a:defRPr/>
+            </a:pPr>
+            <a:r>
+              <a:rPr lang="en-CA" sz="1200" kern="1200" dirty="0">
+                <a:solidFill>
+                  <a:schemeClr val="tx1"/>
+                </a:solidFill>
+                <a:effectLst/>
+                <a:latin typeface="+mn-lt"/>
+                <a:ea typeface="+mn-ea"/>
+                <a:cs typeface="+mn-cs"/>
+              </a:rPr>
+              <a:t>Decentralized</a:t>
+            </a:r>
+          </a:p>
+          <a:p>
+            <a:pPr marL="628650" marR="0" lvl="1" indent="-171450" algn="l" defTabSz="914400" rtl="0" eaLnBrk="1" fontAlgn="auto" latinLnBrk="0" hangingPunct="1">
+              <a:lnSpc>
+                <a:spcPct val="100000"/>
+              </a:lnSpc>
+              <a:spcBef>
+                <a:spcPts val="0"/>
+              </a:spcBef>
+              <a:spcAft>
+                <a:spcPts val="0"/>
+              </a:spcAft>
+              <a:buClrTx/>
+              <a:buSzTx/>
+              <a:buFontTx/>
+              <a:buChar char="-"/>
+              <a:tabLst/>
+              <a:defRPr/>
+            </a:pPr>
+            <a:r>
+              <a:rPr lang="en-CA" sz="1200" kern="1200" dirty="0">
+                <a:solidFill>
+                  <a:schemeClr val="tx1"/>
+                </a:solidFill>
+                <a:effectLst/>
+                <a:latin typeface="+mn-lt"/>
+                <a:ea typeface="+mn-ea"/>
+                <a:cs typeface="+mn-cs"/>
+              </a:rPr>
+              <a:t>No one controls it</a:t>
+            </a:r>
+          </a:p>
+          <a:p>
+            <a:pPr marL="628650" marR="0" lvl="1" indent="-171450" algn="l" defTabSz="914400" rtl="0" eaLnBrk="1" fontAlgn="auto" latinLnBrk="0" hangingPunct="1">
+              <a:lnSpc>
+                <a:spcPct val="100000"/>
+              </a:lnSpc>
+              <a:spcBef>
+                <a:spcPts val="0"/>
+              </a:spcBef>
+              <a:spcAft>
+                <a:spcPts val="0"/>
+              </a:spcAft>
+              <a:buClrTx/>
+              <a:buSzTx/>
+              <a:buFontTx/>
+              <a:buChar char="-"/>
+              <a:tabLst/>
+              <a:defRPr/>
+            </a:pPr>
+            <a:r>
+              <a:rPr lang="en-CA" sz="1200" kern="1200" dirty="0">
+                <a:solidFill>
+                  <a:schemeClr val="tx1"/>
+                </a:solidFill>
+                <a:effectLst/>
+                <a:latin typeface="+mn-lt"/>
+                <a:ea typeface="+mn-ea"/>
+                <a:cs typeface="+mn-cs"/>
+              </a:rPr>
+              <a:t>Every machine that mines BC make up the network so no one person has power over the network</a:t>
+            </a:r>
+          </a:p>
+          <a:p>
+            <a:pPr marL="628650" marR="0" lvl="1" indent="-171450" algn="l" defTabSz="914400" rtl="0" eaLnBrk="1" fontAlgn="auto" latinLnBrk="0" hangingPunct="1">
+              <a:lnSpc>
+                <a:spcPct val="100000"/>
+              </a:lnSpc>
+              <a:spcBef>
+                <a:spcPts val="0"/>
+              </a:spcBef>
+              <a:spcAft>
+                <a:spcPts val="0"/>
+              </a:spcAft>
+              <a:buClrTx/>
+              <a:buSzTx/>
+              <a:buFontTx/>
+              <a:buChar char="-"/>
+              <a:tabLst/>
+              <a:defRPr/>
+            </a:pPr>
+            <a:r>
+              <a:rPr lang="en-CA" sz="1200" kern="1200" dirty="0">
+                <a:solidFill>
+                  <a:schemeClr val="tx1"/>
+                </a:solidFill>
+                <a:effectLst/>
+                <a:latin typeface="+mn-lt"/>
+                <a:ea typeface="+mn-ea"/>
+                <a:cs typeface="+mn-cs"/>
+              </a:rPr>
+              <a:t>The currency isn’t printed and is produced by people and computers around the world solving mathematical problems</a:t>
+            </a:r>
+          </a:p>
+          <a:p>
+            <a:pPr marL="171450" marR="0" lvl="0" indent="-171450" algn="l" defTabSz="914400" rtl="0" eaLnBrk="1" fontAlgn="auto" latinLnBrk="0" hangingPunct="1">
+              <a:lnSpc>
+                <a:spcPct val="100000"/>
+              </a:lnSpc>
+              <a:spcBef>
+                <a:spcPts val="0"/>
+              </a:spcBef>
+              <a:spcAft>
+                <a:spcPts val="0"/>
+              </a:spcAft>
+              <a:buClrTx/>
+              <a:buSzTx/>
+              <a:buFontTx/>
+              <a:buChar char="-"/>
+              <a:tabLst/>
+              <a:defRPr/>
+            </a:pPr>
+            <a:r>
+              <a:rPr lang="en-CA" sz="1200" kern="1200" dirty="0">
+                <a:solidFill>
+                  <a:schemeClr val="tx1"/>
+                </a:solidFill>
+                <a:effectLst/>
+                <a:latin typeface="+mn-lt"/>
+                <a:ea typeface="+mn-ea"/>
+                <a:cs typeface="+mn-cs"/>
+              </a:rPr>
+              <a:t>Finite currency</a:t>
+            </a:r>
+          </a:p>
+          <a:p>
+            <a:pPr marL="628650" marR="0" lvl="1" indent="-171450" algn="l" defTabSz="914400" rtl="0" eaLnBrk="1" fontAlgn="auto" latinLnBrk="0" hangingPunct="1">
+              <a:lnSpc>
+                <a:spcPct val="100000"/>
+              </a:lnSpc>
+              <a:spcBef>
+                <a:spcPts val="0"/>
+              </a:spcBef>
+              <a:spcAft>
+                <a:spcPts val="0"/>
+              </a:spcAft>
+              <a:buClrTx/>
+              <a:buSzTx/>
+              <a:buFontTx/>
+              <a:buChar char="-"/>
+              <a:tabLst/>
+              <a:defRPr/>
+            </a:pPr>
+            <a:r>
+              <a:rPr lang="en-CA" sz="1200" kern="1200" dirty="0">
+                <a:solidFill>
+                  <a:schemeClr val="tx1"/>
+                </a:solidFill>
+                <a:effectLst/>
+                <a:latin typeface="+mn-lt"/>
+                <a:ea typeface="+mn-ea"/>
+                <a:cs typeface="+mn-cs"/>
+              </a:rPr>
+              <a:t>Finite amount of Bitcoin available so people can’t produce more to de-value the currency</a:t>
+            </a:r>
+          </a:p>
+          <a:p>
+            <a:pPr marL="628650" marR="0" lvl="1" indent="-171450" algn="l" defTabSz="914400" rtl="0" eaLnBrk="1" fontAlgn="auto" latinLnBrk="0" hangingPunct="1">
+              <a:lnSpc>
+                <a:spcPct val="100000"/>
+              </a:lnSpc>
+              <a:spcBef>
+                <a:spcPts val="0"/>
+              </a:spcBef>
+              <a:spcAft>
+                <a:spcPts val="0"/>
+              </a:spcAft>
+              <a:buClrTx/>
+              <a:buSzTx/>
+              <a:buFontTx/>
+              <a:buChar char="-"/>
+              <a:tabLst/>
+              <a:defRPr/>
+            </a:pPr>
+            <a:r>
+              <a:rPr lang="en-CA" sz="1200" kern="1200" dirty="0">
+                <a:solidFill>
+                  <a:schemeClr val="tx1"/>
+                </a:solidFill>
+                <a:effectLst/>
+                <a:latin typeface="+mn-lt"/>
+                <a:ea typeface="+mn-ea"/>
+                <a:cs typeface="+mn-cs"/>
+              </a:rPr>
+              <a:t>Bitcoins are rewarded to miners for “mining” blocks using computational power</a:t>
+            </a:r>
+          </a:p>
+          <a:p>
+            <a:pPr marL="628650" marR="0" lvl="1" indent="-171450" algn="l" defTabSz="914400" rtl="0" eaLnBrk="1" fontAlgn="auto" latinLnBrk="0" hangingPunct="1">
+              <a:lnSpc>
+                <a:spcPct val="100000"/>
+              </a:lnSpc>
+              <a:spcBef>
+                <a:spcPts val="0"/>
+              </a:spcBef>
+              <a:spcAft>
+                <a:spcPts val="0"/>
+              </a:spcAft>
+              <a:buClrTx/>
+              <a:buSzTx/>
+              <a:buFontTx/>
+              <a:buChar char="-"/>
+              <a:tabLst/>
+              <a:defRPr/>
+            </a:pPr>
+            <a:r>
+              <a:rPr lang="en-CA" sz="1200" kern="1200" dirty="0">
+                <a:solidFill>
+                  <a:schemeClr val="tx1"/>
+                </a:solidFill>
+                <a:effectLst/>
+                <a:latin typeface="+mn-lt"/>
+                <a:ea typeface="+mn-ea"/>
+                <a:cs typeface="+mn-cs"/>
+              </a:rPr>
+              <a:t>This network of “miners” also process transactions made with Bitcoin, making it a standalone payment network. </a:t>
+            </a:r>
+          </a:p>
+          <a:p>
+            <a:pPr marL="628650" marR="0" lvl="1" indent="-171450" algn="l" defTabSz="914400" rtl="0" eaLnBrk="1" fontAlgn="auto" latinLnBrk="0" hangingPunct="1">
+              <a:lnSpc>
+                <a:spcPct val="100000"/>
+              </a:lnSpc>
+              <a:spcBef>
+                <a:spcPts val="0"/>
+              </a:spcBef>
+              <a:spcAft>
+                <a:spcPts val="0"/>
+              </a:spcAft>
+              <a:buClrTx/>
+              <a:buSzTx/>
+              <a:buFontTx/>
+              <a:buChar char="-"/>
+              <a:tabLst/>
+              <a:defRPr/>
+            </a:pPr>
+            <a:r>
+              <a:rPr lang="en-CA" sz="1200" kern="1200" dirty="0">
+                <a:solidFill>
+                  <a:schemeClr val="tx1"/>
+                </a:solidFill>
+                <a:effectLst/>
+                <a:latin typeface="+mn-lt"/>
+                <a:ea typeface="+mn-ea"/>
+                <a:cs typeface="+mn-cs"/>
+              </a:rPr>
+              <a:t>To cap the Bitcoin limit, the mining reward halves every 210,000 blocks</a:t>
+            </a:r>
+          </a:p>
+          <a:p>
+            <a:pPr marL="171450" marR="0" lvl="0" indent="-171450" algn="l" defTabSz="914400" rtl="0" eaLnBrk="1" fontAlgn="auto" latinLnBrk="0" hangingPunct="1">
+              <a:lnSpc>
+                <a:spcPct val="100000"/>
+              </a:lnSpc>
+              <a:spcBef>
+                <a:spcPts val="0"/>
+              </a:spcBef>
+              <a:spcAft>
+                <a:spcPts val="0"/>
+              </a:spcAft>
+              <a:buClrTx/>
+              <a:buSzTx/>
+              <a:buFontTx/>
+              <a:buChar char="-"/>
+              <a:tabLst/>
+              <a:defRPr/>
+            </a:pPr>
+            <a:r>
+              <a:rPr lang="en-CA" sz="1200" kern="1200" dirty="0">
+                <a:solidFill>
+                  <a:schemeClr val="tx1"/>
+                </a:solidFill>
+                <a:effectLst/>
+                <a:latin typeface="+mn-lt"/>
+                <a:ea typeface="+mn-ea"/>
+                <a:cs typeface="+mn-cs"/>
+              </a:rPr>
+              <a:t>Transparent</a:t>
+            </a:r>
+          </a:p>
+          <a:p>
+            <a:pPr marL="628650" marR="0" lvl="1" indent="-171450" algn="l" defTabSz="914400" rtl="0" eaLnBrk="1" fontAlgn="auto" latinLnBrk="0" hangingPunct="1">
+              <a:lnSpc>
+                <a:spcPct val="100000"/>
+              </a:lnSpc>
+              <a:spcBef>
+                <a:spcPts val="0"/>
+              </a:spcBef>
+              <a:spcAft>
+                <a:spcPts val="0"/>
+              </a:spcAft>
+              <a:buClrTx/>
+              <a:buSzTx/>
+              <a:buFontTx/>
+              <a:buChar char="-"/>
+              <a:tabLst/>
+              <a:defRPr/>
+            </a:pPr>
+            <a:r>
+              <a:rPr lang="en-CA" sz="1200" kern="1200" dirty="0">
+                <a:solidFill>
+                  <a:schemeClr val="tx1"/>
+                </a:solidFill>
+                <a:effectLst/>
+                <a:latin typeface="+mn-lt"/>
+                <a:ea typeface="+mn-ea"/>
+                <a:cs typeface="+mn-cs"/>
+              </a:rPr>
+              <a:t>Bitcoin stores details of every single transaction that every happened on the network in a general ledger in the form of a blockchain</a:t>
+            </a:r>
+          </a:p>
+          <a:p>
+            <a:pPr marL="628650" marR="0" lvl="1" indent="-171450" algn="l" defTabSz="914400" rtl="0" eaLnBrk="1" fontAlgn="auto" latinLnBrk="0" hangingPunct="1">
+              <a:lnSpc>
+                <a:spcPct val="100000"/>
+              </a:lnSpc>
+              <a:spcBef>
+                <a:spcPts val="0"/>
+              </a:spcBef>
+              <a:spcAft>
+                <a:spcPts val="0"/>
+              </a:spcAft>
+              <a:buClrTx/>
+              <a:buSzTx/>
+              <a:buFontTx/>
+              <a:buChar char="-"/>
+              <a:tabLst/>
+              <a:defRPr/>
+            </a:pPr>
+            <a:r>
+              <a:rPr lang="en-CA" sz="1200" kern="1200" dirty="0">
+                <a:solidFill>
+                  <a:schemeClr val="tx1"/>
+                </a:solidFill>
+                <a:effectLst/>
+                <a:latin typeface="+mn-lt"/>
+                <a:ea typeface="+mn-ea"/>
+                <a:cs typeface="+mn-cs"/>
+              </a:rPr>
+              <a:t>Everyone knows how much Bitcoins is owned by one address</a:t>
+            </a:r>
+          </a:p>
+          <a:p>
+            <a:pPr marL="171450" marR="0" lvl="0" indent="-171450" algn="l" defTabSz="914400" rtl="0" eaLnBrk="1" fontAlgn="auto" latinLnBrk="0" hangingPunct="1">
+              <a:lnSpc>
+                <a:spcPct val="100000"/>
+              </a:lnSpc>
+              <a:spcBef>
+                <a:spcPts val="0"/>
+              </a:spcBef>
+              <a:spcAft>
+                <a:spcPts val="0"/>
+              </a:spcAft>
+              <a:buClrTx/>
+              <a:buSzTx/>
+              <a:buFontTx/>
+              <a:buChar char="-"/>
+              <a:tabLst/>
+              <a:defRPr/>
+            </a:pPr>
+            <a:r>
+              <a:rPr lang="en-CA" sz="1200" kern="1200" dirty="0">
+                <a:solidFill>
+                  <a:schemeClr val="tx1"/>
+                </a:solidFill>
+                <a:effectLst/>
+                <a:latin typeface="+mn-lt"/>
+                <a:ea typeface="+mn-ea"/>
+                <a:cs typeface="+mn-cs"/>
+              </a:rPr>
+              <a:t>Anonymous Users</a:t>
+            </a:r>
+          </a:p>
+          <a:p>
+            <a:pPr marL="628650" marR="0" lvl="1" indent="-171450" algn="l" defTabSz="914400" rtl="0" eaLnBrk="1" fontAlgn="auto" latinLnBrk="0" hangingPunct="1">
+              <a:lnSpc>
+                <a:spcPct val="100000"/>
+              </a:lnSpc>
+              <a:spcBef>
+                <a:spcPts val="0"/>
+              </a:spcBef>
+              <a:spcAft>
+                <a:spcPts val="0"/>
+              </a:spcAft>
+              <a:buClrTx/>
+              <a:buSzTx/>
+              <a:buFontTx/>
+              <a:buChar char="-"/>
+              <a:tabLst/>
+              <a:defRPr/>
+            </a:pPr>
+            <a:r>
+              <a:rPr lang="en-CA" sz="1200" kern="1200" dirty="0">
+                <a:solidFill>
+                  <a:schemeClr val="tx1"/>
+                </a:solidFill>
+                <a:effectLst/>
+                <a:latin typeface="+mn-lt"/>
+                <a:ea typeface="+mn-ea"/>
+                <a:cs typeface="+mn-cs"/>
+              </a:rPr>
+              <a:t>Bitcoin users are identified via addresses but one user can have multiple addresses to protect their identity</a:t>
+            </a:r>
             <a:endParaRPr lang="en-CA" dirty="0"/>
           </a:p>
         </p:txBody>
@@ -1955,7 +2769,7 @@
           <a:bodyPr/>
           <a:lstStyle/>
           <a:p>
-            <a:pPr marL="0" marR="0" lvl="0" indent="0" algn="l" defTabSz="914400" rtl="0" eaLnBrk="1" fontAlgn="auto" latinLnBrk="0" hangingPunct="1">
+            <a:pPr marL="171450" marR="0" lvl="0" indent="-171450" algn="l" defTabSz="914400" rtl="0" eaLnBrk="1" fontAlgn="auto" latinLnBrk="0" hangingPunct="1">
               <a:lnSpc>
                 <a:spcPct val="100000"/>
               </a:lnSpc>
@@ -1967,8 +2781,8 @@
               </a:spcAft>
               <a:buClrTx/>
               <a:buSzTx/>
-              <a:buFont typeface="Arial" panose="020B0604020202020204" pitchFamily="34" charset="0"/>
-              <a:buNone/>
+              <a:buFontTx/>
+              <a:buChar char="-"/>
               <a:tabLst/>
               <a:defRPr/>
             </a:pPr>
@@ -1982,24 +2796,194 @@
                 <a:ea typeface="+mn-ea"/>
                 <a:cs typeface="+mn-cs"/>
               </a:rPr>
-              <a:t>This is a general overview of the main methodology that was employed in this paper. To do their analysis, they first extracted the core from the Bitcoin network over two years. Then they constructed daily snapshots of transactions for the core network. Next, they concatenated all the snapshots into a matrix where each row corresponded to a day’s transactions and each column corresponding to a transaction. Finally, for analysis, they used Principal Component Analysis to identify the key features in the evolution of the network over time. Finally, they analyzed the base-network decay, the time-varying contribution of each base network, and the correlation between the network and the exchange rate.</a:t>
-            </a:r>
-            <a:endParaRPr lang="en-US" sz="1200" kern="1200" dirty="0">
-              <a:solidFill>
-                <a:schemeClr val="tx1"/>
-              </a:solidFill>
-              <a:effectLst/>
-              <a:latin typeface="+mn-lt"/>
-              <a:ea typeface="+mn-ea"/>
-              <a:cs typeface="+mn-cs"/>
-            </a:endParaRPr>
-          </a:p>
-          <a:p>
-            <a:pPr marL="0" indent="0">
-              <a:buFont typeface="Arial" panose="020B0604020202020204" pitchFamily="34" charset="0"/>
-              <a:buNone/>
+              <a:t>General overview of the main methodology that was employed in this paper</a:t>
+            </a:r>
+          </a:p>
+          <a:p>
+            <a:pPr marL="171450" marR="0" lvl="0" indent="-171450" algn="l" defTabSz="914400" rtl="0" eaLnBrk="1" fontAlgn="auto" latinLnBrk="0" hangingPunct="1">
+              <a:lnSpc>
+                <a:spcPct val="100000"/>
+              </a:lnSpc>
+              <a:spcBef>
+                <a:spcPts val="0"/>
+              </a:spcBef>
+              <a:spcAft>
+                <a:spcPts val="0"/>
+              </a:spcAft>
+              <a:buClrTx/>
+              <a:buSzTx/>
+              <a:buFontTx/>
+              <a:buChar char="-"/>
+              <a:tabLst/>
+              <a:defRPr/>
             </a:pPr>
-            <a:endParaRPr lang="en-CA" dirty="0"/>
+            <a:r>
+              <a:rPr lang="en-CA" sz="1200" kern="1200" dirty="0">
+                <a:solidFill>
+                  <a:schemeClr val="tx1"/>
+                </a:solidFill>
+                <a:effectLst/>
+                <a:latin typeface="+mn-lt"/>
+                <a:ea typeface="+mn-ea"/>
+                <a:cs typeface="+mn-cs"/>
+              </a:rPr>
+              <a:t>They first extracted the core network of active users from the Bitcoin network over 2 years</a:t>
+            </a:r>
+          </a:p>
+          <a:p>
+            <a:pPr marL="171450" marR="0" lvl="0" indent="-171450" algn="l" defTabSz="914400" rtl="0" eaLnBrk="1" fontAlgn="auto" latinLnBrk="0" hangingPunct="1">
+              <a:lnSpc>
+                <a:spcPct val="100000"/>
+              </a:lnSpc>
+              <a:spcBef>
+                <a:spcPts val="0"/>
+              </a:spcBef>
+              <a:spcAft>
+                <a:spcPts val="0"/>
+              </a:spcAft>
+              <a:buClrTx/>
+              <a:buSzTx/>
+              <a:buFontTx/>
+              <a:buChar char="-"/>
+              <a:tabLst/>
+              <a:defRPr/>
+            </a:pPr>
+            <a:r>
+              <a:rPr lang="en-CA" sz="1200" kern="1200" dirty="0">
+                <a:solidFill>
+                  <a:schemeClr val="tx1"/>
+                </a:solidFill>
+                <a:effectLst/>
+                <a:latin typeface="+mn-lt"/>
+                <a:ea typeface="+mn-ea"/>
+                <a:cs typeface="+mn-cs"/>
+              </a:rPr>
+              <a:t>They then constructed daily snapshots of transactions for the core network</a:t>
+            </a:r>
+          </a:p>
+          <a:p>
+            <a:pPr marL="171450" marR="0" lvl="0" indent="-171450" algn="l" defTabSz="914400" rtl="0" eaLnBrk="1" fontAlgn="auto" latinLnBrk="0" hangingPunct="1">
+              <a:lnSpc>
+                <a:spcPct val="100000"/>
+              </a:lnSpc>
+              <a:spcBef>
+                <a:spcPts val="0"/>
+              </a:spcBef>
+              <a:spcAft>
+                <a:spcPts val="0"/>
+              </a:spcAft>
+              <a:buClrTx/>
+              <a:buSzTx/>
+              <a:buFontTx/>
+              <a:buChar char="-"/>
+              <a:tabLst/>
+              <a:defRPr/>
+            </a:pPr>
+            <a:r>
+              <a:rPr lang="en-CA" sz="1200" kern="1200" dirty="0">
+                <a:solidFill>
+                  <a:schemeClr val="tx1"/>
+                </a:solidFill>
+                <a:effectLst/>
+                <a:latin typeface="+mn-lt"/>
+                <a:ea typeface="+mn-ea"/>
+                <a:cs typeface="+mn-cs"/>
+              </a:rPr>
+              <a:t>The daily snapshots were then combined into a matrix</a:t>
+            </a:r>
+          </a:p>
+          <a:p>
+            <a:pPr marL="171450" marR="0" lvl="0" indent="-171450" algn="l" defTabSz="914400" rtl="0" eaLnBrk="1" fontAlgn="auto" latinLnBrk="0" hangingPunct="1">
+              <a:lnSpc>
+                <a:spcPct val="100000"/>
+              </a:lnSpc>
+              <a:spcBef>
+                <a:spcPts val="0"/>
+              </a:spcBef>
+              <a:spcAft>
+                <a:spcPts val="0"/>
+              </a:spcAft>
+              <a:buClrTx/>
+              <a:buSzTx/>
+              <a:buFontTx/>
+              <a:buChar char="-"/>
+              <a:tabLst/>
+              <a:defRPr/>
+            </a:pPr>
+            <a:r>
+              <a:rPr lang="en-CA" sz="1200" kern="1200" dirty="0">
+                <a:solidFill>
+                  <a:schemeClr val="tx1"/>
+                </a:solidFill>
+                <a:effectLst/>
+                <a:latin typeface="+mn-lt"/>
+                <a:ea typeface="+mn-ea"/>
+                <a:cs typeface="+mn-cs"/>
+              </a:rPr>
+              <a:t>Finally, for analysis, Principal Component Analysis was performed on this matrix to identify the key features in the evolution of the network over time</a:t>
+            </a:r>
+          </a:p>
+          <a:p>
+            <a:pPr marL="171450" marR="0" lvl="0" indent="-171450" algn="l" defTabSz="914400" rtl="0" eaLnBrk="1" fontAlgn="auto" latinLnBrk="0" hangingPunct="1">
+              <a:lnSpc>
+                <a:spcPct val="100000"/>
+              </a:lnSpc>
+              <a:spcBef>
+                <a:spcPts val="0"/>
+              </a:spcBef>
+              <a:spcAft>
+                <a:spcPts val="0"/>
+              </a:spcAft>
+              <a:buClrTx/>
+              <a:buSzTx/>
+              <a:buFontTx/>
+              <a:buChar char="-"/>
+              <a:tabLst/>
+              <a:defRPr/>
+            </a:pPr>
+            <a:r>
+              <a:rPr lang="en-CA" sz="1200" kern="1200" dirty="0">
+                <a:solidFill>
+                  <a:schemeClr val="tx1"/>
+                </a:solidFill>
+                <a:effectLst/>
+                <a:latin typeface="+mn-lt"/>
+                <a:ea typeface="+mn-ea"/>
+                <a:cs typeface="+mn-cs"/>
+              </a:rPr>
+              <a:t>The results were then analyzed to identify network changes the relationship between the network structure and the exchange rate</a:t>
+            </a:r>
+          </a:p>
+          <a:p>
+            <a:pPr marL="171450" marR="0" lvl="0" indent="-171450" algn="l" defTabSz="914400" rtl="0" eaLnBrk="1" fontAlgn="auto" latinLnBrk="0" hangingPunct="1">
+              <a:lnSpc>
+                <a:spcPct val="100000"/>
+              </a:lnSpc>
+              <a:spcBef>
+                <a:spcPts val="0"/>
+              </a:spcBef>
+              <a:spcAft>
+                <a:spcPts val="0"/>
+              </a:spcAft>
+              <a:buClrTx/>
+              <a:buSzTx/>
+              <a:buFontTx/>
+              <a:buChar char="-"/>
+              <a:tabLst/>
+              <a:defRPr/>
+            </a:pPr>
+            <a:r>
+              <a:rPr lang="en-CA" sz="1200" kern="1200" dirty="0">
+                <a:solidFill>
+                  <a:schemeClr val="tx1"/>
+                </a:solidFill>
+                <a:effectLst/>
+                <a:latin typeface="+mn-lt"/>
+                <a:ea typeface="+mn-ea"/>
+                <a:cs typeface="+mn-cs"/>
+              </a:rPr>
+              <a:t>This methodology will be elaborated on throughout this presentation</a:t>
+            </a:r>
           </a:p>
         </p:txBody>
       </p:sp>
@@ -2083,7 +3067,7 @@
           <a:bodyPr/>
           <a:lstStyle/>
           <a:p>
-            <a:pPr marL="0" marR="0" lvl="0" indent="0" algn="l" defTabSz="914400" rtl="0" eaLnBrk="1" fontAlgn="auto" latinLnBrk="0" hangingPunct="1">
+            <a:pPr marL="171450" marR="0" lvl="0" indent="-171450" algn="l" defTabSz="914400" rtl="0" eaLnBrk="1" fontAlgn="auto" latinLnBrk="0" hangingPunct="1">
               <a:lnSpc>
                 <a:spcPct val="100000"/>
               </a:lnSpc>
@@ -2095,8 +3079,8 @@
               </a:spcAft>
               <a:buClrTx/>
               <a:buSzTx/>
-              <a:buFont typeface="Arial" panose="020B0604020202020204" pitchFamily="34" charset="0"/>
-              <a:buNone/>
+              <a:buFontTx/>
+              <a:buChar char="-"/>
               <a:tabLst/>
               <a:defRPr/>
             </a:pPr>
@@ -2110,7 +3094,7 @@
                 <a:ea typeface="+mn-ea"/>
                 <a:cs typeface="+mn-cs"/>
               </a:rPr>
-              <a:t>The data for this paper was acquired from a slightly modified version of the open-source </a:t>
+              <a:t>Their data was acquired from a slightly modified version of the open-source </a:t>
             </a:r>
             <a:r>
               <a:rPr lang="en-CA" sz="1200" kern="1200" dirty="0" err="1">
@@ -2134,23 +3118,194 @@
                 <a:ea typeface="+mn-ea"/>
                 <a:cs typeface="+mn-cs"/>
               </a:rPr>
-              <a:t> client. They collected the entire list of transactions for 2012 and 2013 on March 3, 2014. The schema of their data was sending address, the receiving address, the value sent, and the time of transaction.</a:t>
-            </a:r>
-            <a:endParaRPr lang="en-US" sz="1200" kern="1200" dirty="0">
-              <a:solidFill>
-                <a:schemeClr val="tx1"/>
-              </a:solidFill>
-              <a:effectLst/>
-              <a:latin typeface="+mn-lt"/>
-              <a:ea typeface="+mn-ea"/>
-              <a:cs typeface="+mn-cs"/>
-            </a:endParaRPr>
-          </a:p>
-          <a:p>
-            <a:pPr marL="0" indent="0">
-              <a:buFont typeface="Arial" panose="020B0604020202020204" pitchFamily="34" charset="0"/>
-              <a:buNone/>
+              <a:t> client</a:t>
+            </a:r>
+          </a:p>
+          <a:p>
+            <a:pPr marL="171450" marR="0" lvl="0" indent="-171450" algn="l" defTabSz="914400" rtl="0" eaLnBrk="1" fontAlgn="auto" latinLnBrk="0" hangingPunct="1">
+              <a:lnSpc>
+                <a:spcPct val="100000"/>
+              </a:lnSpc>
+              <a:spcBef>
+                <a:spcPts val="0"/>
+              </a:spcBef>
+              <a:spcAft>
+                <a:spcPts val="0"/>
+              </a:spcAft>
+              <a:buClrTx/>
+              <a:buSzTx/>
+              <a:buFontTx/>
+              <a:buChar char="-"/>
+              <a:tabLst/>
+              <a:defRPr/>
             </a:pPr>
+            <a:r>
+              <a:rPr lang="en-CA" sz="1200" kern="1200" dirty="0">
+                <a:solidFill>
+                  <a:schemeClr val="tx1"/>
+                </a:solidFill>
+                <a:effectLst/>
+                <a:latin typeface="+mn-lt"/>
+                <a:ea typeface="+mn-ea"/>
+                <a:cs typeface="+mn-cs"/>
+              </a:rPr>
+              <a:t>They collected the entire list of transactions for 2012/2013 on March 3, 2014</a:t>
+            </a:r>
+          </a:p>
+          <a:p>
+            <a:pPr marL="171450" marR="0" lvl="0" indent="-171450" algn="l" defTabSz="914400" rtl="0" eaLnBrk="1" fontAlgn="auto" latinLnBrk="0" hangingPunct="1">
+              <a:lnSpc>
+                <a:spcPct val="100000"/>
+              </a:lnSpc>
+              <a:spcBef>
+                <a:spcPts val="0"/>
+              </a:spcBef>
+              <a:spcAft>
+                <a:spcPts val="0"/>
+              </a:spcAft>
+              <a:buClrTx/>
+              <a:buSzTx/>
+              <a:buFontTx/>
+              <a:buChar char="-"/>
+              <a:tabLst/>
+              <a:defRPr/>
+            </a:pPr>
+            <a:r>
+              <a:rPr lang="en-CA" sz="1200" kern="1200" dirty="0">
+                <a:solidFill>
+                  <a:schemeClr val="tx1"/>
+                </a:solidFill>
+                <a:effectLst/>
+                <a:latin typeface="+mn-lt"/>
+                <a:ea typeface="+mn-ea"/>
+                <a:cs typeface="+mn-cs"/>
+              </a:rPr>
+              <a:t>The schema of the data the collected included:</a:t>
+            </a:r>
+          </a:p>
+          <a:p>
+            <a:pPr marL="628650" marR="0" lvl="1" indent="-171450" algn="l" defTabSz="914400" rtl="0" eaLnBrk="1" fontAlgn="auto" latinLnBrk="0" hangingPunct="1">
+              <a:lnSpc>
+                <a:spcPct val="100000"/>
+              </a:lnSpc>
+              <a:spcBef>
+                <a:spcPts val="0"/>
+              </a:spcBef>
+              <a:spcAft>
+                <a:spcPts val="0"/>
+              </a:spcAft>
+              <a:buClrTx/>
+              <a:buSzTx/>
+              <a:buFontTx/>
+              <a:buChar char="-"/>
+              <a:tabLst/>
+              <a:defRPr/>
+            </a:pPr>
+            <a:r>
+              <a:rPr lang="en-CA" sz="1200" kern="1200" dirty="0">
+                <a:solidFill>
+                  <a:schemeClr val="tx1"/>
+                </a:solidFill>
+                <a:effectLst/>
+                <a:latin typeface="+mn-lt"/>
+                <a:ea typeface="+mn-ea"/>
+                <a:cs typeface="+mn-cs"/>
+              </a:rPr>
+              <a:t>The sending address</a:t>
+            </a:r>
+          </a:p>
+          <a:p>
+            <a:pPr marL="628650" marR="0" lvl="1" indent="-171450" algn="l" defTabSz="914400" rtl="0" eaLnBrk="1" fontAlgn="auto" latinLnBrk="0" hangingPunct="1">
+              <a:lnSpc>
+                <a:spcPct val="100000"/>
+              </a:lnSpc>
+              <a:spcBef>
+                <a:spcPts val="0"/>
+              </a:spcBef>
+              <a:spcAft>
+                <a:spcPts val="0"/>
+              </a:spcAft>
+              <a:buClrTx/>
+              <a:buSzTx/>
+              <a:buFontTx/>
+              <a:buChar char="-"/>
+              <a:tabLst/>
+              <a:defRPr/>
+            </a:pPr>
+            <a:r>
+              <a:rPr lang="en-CA" sz="1200" kern="1200" dirty="0">
+                <a:solidFill>
+                  <a:schemeClr val="tx1"/>
+                </a:solidFill>
+                <a:effectLst/>
+                <a:latin typeface="+mn-lt"/>
+                <a:ea typeface="+mn-ea"/>
+                <a:cs typeface="+mn-cs"/>
+              </a:rPr>
+              <a:t>the receiving address</a:t>
+            </a:r>
+          </a:p>
+          <a:p>
+            <a:pPr marL="628650" marR="0" lvl="1" indent="-171450" algn="l" defTabSz="914400" rtl="0" eaLnBrk="1" fontAlgn="auto" latinLnBrk="0" hangingPunct="1">
+              <a:lnSpc>
+                <a:spcPct val="100000"/>
+              </a:lnSpc>
+              <a:spcBef>
+                <a:spcPts val="0"/>
+              </a:spcBef>
+              <a:spcAft>
+                <a:spcPts val="0"/>
+              </a:spcAft>
+              <a:buClrTx/>
+              <a:buSzTx/>
+              <a:buFontTx/>
+              <a:buChar char="-"/>
+              <a:tabLst/>
+              <a:defRPr/>
+            </a:pPr>
+            <a:r>
+              <a:rPr lang="en-CA" sz="1200" kern="1200" dirty="0">
+                <a:solidFill>
+                  <a:schemeClr val="tx1"/>
+                </a:solidFill>
+                <a:effectLst/>
+                <a:latin typeface="+mn-lt"/>
+                <a:ea typeface="+mn-ea"/>
+                <a:cs typeface="+mn-cs"/>
+              </a:rPr>
+              <a:t>the value sent</a:t>
+            </a:r>
+          </a:p>
+          <a:p>
+            <a:pPr marL="628650" marR="0" lvl="1" indent="-171450" algn="l" defTabSz="914400" rtl="0" eaLnBrk="1" fontAlgn="auto" latinLnBrk="0" hangingPunct="1">
+              <a:lnSpc>
+                <a:spcPct val="100000"/>
+              </a:lnSpc>
+              <a:spcBef>
+                <a:spcPts val="0"/>
+              </a:spcBef>
+              <a:spcAft>
+                <a:spcPts val="0"/>
+              </a:spcAft>
+              <a:buClrTx/>
+              <a:buSzTx/>
+              <a:buFontTx/>
+              <a:buChar char="-"/>
+              <a:tabLst/>
+              <a:defRPr/>
+            </a:pPr>
+            <a:r>
+              <a:rPr lang="en-CA" sz="1200" kern="1200" dirty="0">
+                <a:solidFill>
+                  <a:schemeClr val="tx1"/>
+                </a:solidFill>
+                <a:effectLst/>
+                <a:latin typeface="+mn-lt"/>
+                <a:ea typeface="+mn-ea"/>
+                <a:cs typeface="+mn-cs"/>
+              </a:rPr>
+              <a:t>the time of the transaction.</a:t>
+            </a:r>
             <a:endParaRPr lang="en-CA" dirty="0"/>
           </a:p>
         </p:txBody>
@@ -2235,7 +3390,7 @@
           <a:bodyPr/>
           <a:lstStyle/>
           <a:p>
-            <a:pPr marL="0" marR="0" lvl="0" indent="0" algn="l" defTabSz="914400" rtl="0" eaLnBrk="1" fontAlgn="auto" latinLnBrk="0" hangingPunct="1">
+            <a:pPr marL="171450" marR="0" lvl="0" indent="-171450" algn="l" defTabSz="914400" rtl="0" eaLnBrk="1" fontAlgn="auto" latinLnBrk="0" hangingPunct="1">
               <a:lnSpc>
                 <a:spcPct val="100000"/>
               </a:lnSpc>
@@ -2247,8 +3402,8 @@
               </a:spcAft>
               <a:buClrTx/>
               <a:buSzTx/>
-              <a:buFont typeface="Arial" panose="020B0604020202020204" pitchFamily="34" charset="0"/>
-              <a:buNone/>
+              <a:buFontTx/>
+              <a:buChar char="-"/>
               <a:tabLst/>
               <a:defRPr/>
             </a:pPr>
@@ -2262,7 +3417,255 @@
                 <a:ea typeface="+mn-ea"/>
                 <a:cs typeface="+mn-cs"/>
               </a:rPr>
-              <a:t>Their goal here was the extract the subgraph of the most active users. They did this by first contracting the graph. They did this by first identifying all the transactions with multiple inputs and then they assumed that if multiple addresses were involved in the same transaction, they belonged to the same user. They justified this assumption because users needed an account’s private key to use an account in a transaction. They, then identified 2 active cores within this subgraph. The first active core was defined as the long-term core which consisted of users active in greater than individual transactions, and active greater that 60 consecutive days. The second active core was defined as the all-users core which consisted of the 2000 most active users. The users that were associated with the Satoshi gambling site were excluded because they were considered statistical outliers and not related to the normal operation of the Bitcoin network.</a:t>
+              <a:t>They first extracted the active core from the bitcoin transaction network to remove unnecessary information</a:t>
+            </a:r>
+          </a:p>
+          <a:p>
+            <a:pPr marL="171450" marR="0" lvl="0" indent="-171450" algn="l" defTabSz="914400" rtl="0" eaLnBrk="1" fontAlgn="auto" latinLnBrk="0" hangingPunct="1">
+              <a:lnSpc>
+                <a:spcPct val="100000"/>
+              </a:lnSpc>
+              <a:spcBef>
+                <a:spcPts val="0"/>
+              </a:spcBef>
+              <a:spcAft>
+                <a:spcPts val="0"/>
+              </a:spcAft>
+              <a:buClrTx/>
+              <a:buSzTx/>
+              <a:buFontTx/>
+              <a:buChar char="-"/>
+              <a:tabLst/>
+              <a:defRPr/>
+            </a:pPr>
+            <a:r>
+              <a:rPr lang="en-CA" sz="1200" kern="1200" dirty="0">
+                <a:solidFill>
+                  <a:schemeClr val="tx1"/>
+                </a:solidFill>
+                <a:effectLst/>
+                <a:latin typeface="+mn-lt"/>
+                <a:ea typeface="+mn-ea"/>
+                <a:cs typeface="+mn-cs"/>
+              </a:rPr>
+              <a:t>To contract their graph, they first identified all the transactions with multiple inputs and then they assumed that if multiple addresses were involved in the same transaction, they belonged to the same user</a:t>
+            </a:r>
+          </a:p>
+          <a:p>
+            <a:pPr marL="171450" marR="0" lvl="0" indent="-171450" algn="l" defTabSz="914400" rtl="0" eaLnBrk="1" fontAlgn="auto" latinLnBrk="0" hangingPunct="1">
+              <a:lnSpc>
+                <a:spcPct val="100000"/>
+              </a:lnSpc>
+              <a:spcBef>
+                <a:spcPts val="0"/>
+              </a:spcBef>
+              <a:spcAft>
+                <a:spcPts val="0"/>
+              </a:spcAft>
+              <a:buClrTx/>
+              <a:buSzTx/>
+              <a:buFontTx/>
+              <a:buChar char="-"/>
+              <a:tabLst/>
+              <a:defRPr/>
+            </a:pPr>
+            <a:r>
+              <a:rPr lang="en-CA" sz="1200" kern="1200" dirty="0">
+                <a:solidFill>
+                  <a:schemeClr val="tx1"/>
+                </a:solidFill>
+                <a:effectLst/>
+                <a:latin typeface="+mn-lt"/>
+                <a:ea typeface="+mn-ea"/>
+                <a:cs typeface="+mn-cs"/>
+              </a:rPr>
+              <a:t>They justified this assumption because users needed an account’s private key to use an account in a transaction</a:t>
+            </a:r>
+          </a:p>
+          <a:p>
+            <a:pPr marL="171450" marR="0" lvl="0" indent="-171450" algn="l" defTabSz="914400" rtl="0" eaLnBrk="1" fontAlgn="auto" latinLnBrk="0" hangingPunct="1">
+              <a:lnSpc>
+                <a:spcPct val="100000"/>
+              </a:lnSpc>
+              <a:spcBef>
+                <a:spcPts val="0"/>
+              </a:spcBef>
+              <a:spcAft>
+                <a:spcPts val="0"/>
+              </a:spcAft>
+              <a:buClrTx/>
+              <a:buSzTx/>
+              <a:buFontTx/>
+              <a:buChar char="-"/>
+              <a:tabLst/>
+              <a:defRPr/>
+            </a:pPr>
+            <a:r>
+              <a:rPr lang="en-CA" sz="1200" kern="1200" dirty="0">
+                <a:solidFill>
+                  <a:schemeClr val="tx1"/>
+                </a:solidFill>
+                <a:effectLst/>
+                <a:latin typeface="+mn-lt"/>
+                <a:ea typeface="+mn-ea"/>
+                <a:cs typeface="+mn-cs"/>
+              </a:rPr>
+              <a:t>They then identified 2 active cores within the contracted graph</a:t>
+            </a:r>
+          </a:p>
+          <a:p>
+            <a:pPr marL="628650" marR="0" lvl="1" indent="-171450" algn="l" defTabSz="914400" rtl="0" eaLnBrk="1" fontAlgn="auto" latinLnBrk="0" hangingPunct="1">
+              <a:lnSpc>
+                <a:spcPct val="100000"/>
+              </a:lnSpc>
+              <a:spcBef>
+                <a:spcPts val="0"/>
+              </a:spcBef>
+              <a:spcAft>
+                <a:spcPts val="0"/>
+              </a:spcAft>
+              <a:buClrTx/>
+              <a:buSzTx/>
+              <a:buFontTx/>
+              <a:buChar char="-"/>
+              <a:tabLst/>
+              <a:defRPr/>
+            </a:pPr>
+            <a:r>
+              <a:rPr lang="en-CA" sz="1200" kern="1200" dirty="0">
+                <a:solidFill>
+                  <a:schemeClr val="tx1"/>
+                </a:solidFill>
+                <a:effectLst/>
+                <a:latin typeface="+mn-lt"/>
+                <a:ea typeface="+mn-ea"/>
+                <a:cs typeface="+mn-cs"/>
+              </a:rPr>
+              <a:t>The first was identified as the long term core which corresponded to users that were involved in &gt;100 individual transactions and active for greater than 60 consecutive days</a:t>
+            </a:r>
+          </a:p>
+          <a:p>
+            <a:pPr marL="628650" marR="0" lvl="1" indent="-171450" algn="l" defTabSz="914400" rtl="0" eaLnBrk="1" fontAlgn="auto" latinLnBrk="0" hangingPunct="1">
+              <a:lnSpc>
+                <a:spcPct val="100000"/>
+              </a:lnSpc>
+              <a:spcBef>
+                <a:spcPts val="0"/>
+              </a:spcBef>
+              <a:spcAft>
+                <a:spcPts val="0"/>
+              </a:spcAft>
+              <a:buClrTx/>
+              <a:buSzTx/>
+              <a:buFontTx/>
+              <a:buChar char="-"/>
+              <a:tabLst/>
+              <a:defRPr/>
+            </a:pPr>
+            <a:r>
+              <a:rPr lang="en-CA" sz="1200" kern="1200" dirty="0">
+                <a:solidFill>
+                  <a:schemeClr val="tx1"/>
+                </a:solidFill>
+                <a:effectLst/>
+                <a:latin typeface="+mn-lt"/>
+                <a:ea typeface="+mn-ea"/>
+                <a:cs typeface="+mn-cs"/>
+              </a:rPr>
+              <a:t>The second was identified as the all users core and it consisted of the 2000 most active users</a:t>
+            </a:r>
+          </a:p>
+          <a:p>
+            <a:pPr marL="171450" marR="0" lvl="0" indent="-171450" algn="l" defTabSz="914400" rtl="0" eaLnBrk="1" fontAlgn="auto" latinLnBrk="0" hangingPunct="1">
+              <a:lnSpc>
+                <a:spcPct val="100000"/>
+              </a:lnSpc>
+              <a:spcBef>
+                <a:spcPts val="0"/>
+              </a:spcBef>
+              <a:spcAft>
+                <a:spcPts val="0"/>
+              </a:spcAft>
+              <a:buClrTx/>
+              <a:buSzTx/>
+              <a:buFontTx/>
+              <a:buChar char="-"/>
+              <a:tabLst/>
+              <a:defRPr/>
+            </a:pPr>
+            <a:r>
+              <a:rPr lang="en-CA" sz="1200" kern="1200" dirty="0">
+                <a:solidFill>
+                  <a:schemeClr val="tx1"/>
+                </a:solidFill>
+                <a:effectLst/>
+                <a:latin typeface="+mn-lt"/>
+                <a:ea typeface="+mn-ea"/>
+                <a:cs typeface="+mn-cs"/>
+              </a:rPr>
+              <a:t>They excluded any user that was associated with the Satoshi gambling site</a:t>
+            </a:r>
+          </a:p>
+          <a:p>
+            <a:pPr marL="628650" marR="0" lvl="1" indent="-171450" algn="l" defTabSz="914400" rtl="0" eaLnBrk="1" fontAlgn="auto" latinLnBrk="0" hangingPunct="1">
+              <a:lnSpc>
+                <a:spcPct val="100000"/>
+              </a:lnSpc>
+              <a:spcBef>
+                <a:spcPts val="0"/>
+              </a:spcBef>
+              <a:spcAft>
+                <a:spcPts val="0"/>
+              </a:spcAft>
+              <a:buClrTx/>
+              <a:buSzTx/>
+              <a:buFontTx/>
+              <a:buChar char="-"/>
+              <a:tabLst/>
+              <a:defRPr/>
+            </a:pPr>
+            <a:r>
+              <a:rPr lang="en-CA" sz="1200" kern="1200" dirty="0">
+                <a:solidFill>
+                  <a:schemeClr val="tx1"/>
+                </a:solidFill>
+                <a:effectLst/>
+                <a:latin typeface="+mn-lt"/>
+                <a:ea typeface="+mn-ea"/>
+                <a:cs typeface="+mn-cs"/>
+              </a:rPr>
+              <a:t>because they were considered statistical outliers </a:t>
+            </a:r>
+          </a:p>
+          <a:p>
+            <a:pPr marL="628650" marR="0" lvl="1" indent="-171450" algn="l" defTabSz="914400" rtl="0" eaLnBrk="1" fontAlgn="auto" latinLnBrk="0" hangingPunct="1">
+              <a:lnSpc>
+                <a:spcPct val="100000"/>
+              </a:lnSpc>
+              <a:spcBef>
+                <a:spcPts val="0"/>
+              </a:spcBef>
+              <a:spcAft>
+                <a:spcPts val="0"/>
+              </a:spcAft>
+              <a:buClrTx/>
+              <a:buSzTx/>
+              <a:buFontTx/>
+              <a:buChar char="-"/>
+              <a:tabLst/>
+              <a:defRPr/>
+            </a:pPr>
+            <a:r>
+              <a:rPr lang="en-CA" sz="1200" kern="1200" dirty="0">
+                <a:solidFill>
+                  <a:schemeClr val="tx1"/>
+                </a:solidFill>
+                <a:effectLst/>
+                <a:latin typeface="+mn-lt"/>
+                <a:ea typeface="+mn-ea"/>
+                <a:cs typeface="+mn-cs"/>
+              </a:rPr>
+              <a:t>not related to the normal operation of the Bitcoin network.</a:t>
             </a:r>
             <a:endParaRPr lang="en-US" sz="1200" kern="1200" dirty="0">
               <a:solidFill>
@@ -2390,23 +3793,70 @@
                 <a:ea typeface="+mn-ea"/>
                 <a:cs typeface="+mn-cs"/>
               </a:rPr>
-              <a:t>The main goal here was to extract important structural changes from the graph by comparing successive daily snapshots using Principal Component Analysis. Here, the daily snapshot is defined a weighted network where the weight of each link is equal to the number of transactions that occurred between node u and v. Finally, the used Principal Component Analysis to determine the significant basis vectors on a matrix of concatenated daily snapshots. </a:t>
-            </a:r>
-            <a:endParaRPr lang="en-US" sz="1200" kern="1200" dirty="0">
-              <a:solidFill>
-                <a:schemeClr val="tx1"/>
-              </a:solidFill>
-              <a:effectLst/>
-              <a:latin typeface="+mn-lt"/>
-              <a:ea typeface="+mn-ea"/>
-              <a:cs typeface="+mn-cs"/>
-            </a:endParaRPr>
-          </a:p>
-          <a:p>
-            <a:pPr marL="0" indent="0">
-              <a:buFont typeface="Arial" panose="020B0604020202020204" pitchFamily="34" charset="0"/>
+              <a:t>-  The next went on to extract the important structural changes from the graph by comparing successive daily snapshots using PCA. </a:t>
+            </a:r>
+          </a:p>
+          <a:p>
+            <a:pPr marL="0" marR="0" lvl="0" indent="0" algn="l" defTabSz="914400" rtl="0" eaLnBrk="1" fontAlgn="auto" latinLnBrk="0" hangingPunct="1">
+              <a:lnSpc>
+                <a:spcPct val="100000"/>
+              </a:lnSpc>
+              <a:spcBef>
+                <a:spcPts val="0"/>
+              </a:spcBef>
+              <a:spcAft>
+                <a:spcPts val="0"/>
+              </a:spcAft>
+              <a:buClrTx/>
+              <a:buSzTx/>
+              <a:buFontTx/>
               <a:buNone/>
+              <a:tabLst/>
+              <a:defRPr/>
             </a:pPr>
+            <a:r>
+              <a:rPr lang="en-CA" sz="1200" kern="1200" dirty="0">
+                <a:solidFill>
+                  <a:schemeClr val="tx1"/>
+                </a:solidFill>
+                <a:effectLst/>
+                <a:latin typeface="+mn-lt"/>
+                <a:ea typeface="+mn-ea"/>
+                <a:cs typeface="+mn-cs"/>
+              </a:rPr>
+              <a:t>-  To do this they constructed a weighted adjacency matrix for each day, converted the matrix into a vector, and concatenated all the days’ vectors into one matrix. </a:t>
+            </a:r>
+          </a:p>
+          <a:p>
+            <a:pPr marL="0" marR="0" lvl="0" indent="0" algn="l" defTabSz="914400" rtl="0" eaLnBrk="1" fontAlgn="auto" latinLnBrk="0" hangingPunct="1">
+              <a:lnSpc>
+                <a:spcPct val="100000"/>
+              </a:lnSpc>
+              <a:spcBef>
+                <a:spcPts val="0"/>
+              </a:spcBef>
+              <a:spcAft>
+                <a:spcPts val="0"/>
+              </a:spcAft>
+              <a:buClrTx/>
+              <a:buSzTx/>
+              <a:buFontTx/>
+              <a:buNone/>
+              <a:tabLst/>
+              <a:defRPr/>
+            </a:pPr>
+            <a:r>
+              <a:rPr lang="en-CA" sz="1200" kern="1200" dirty="0">
+                <a:solidFill>
+                  <a:schemeClr val="tx1"/>
+                </a:solidFill>
+                <a:effectLst/>
+                <a:latin typeface="+mn-lt"/>
+                <a:ea typeface="+mn-ea"/>
+                <a:cs typeface="+mn-cs"/>
+              </a:rPr>
+              <a:t>-  Then they then ran PCA analysis to identify the significant basis vectors. </a:t>
+            </a:r>
             <a:endParaRPr lang="en-CA" dirty="0"/>
           </a:p>
         </p:txBody>
@@ -2491,7 +3941,7 @@
           <a:bodyPr/>
           <a:lstStyle/>
           <a:p>
-            <a:pPr marL="0" marR="0" lvl="0" indent="0" algn="l" defTabSz="914400" rtl="0" eaLnBrk="1" fontAlgn="auto" latinLnBrk="0" hangingPunct="1">
+            <a:pPr marL="171450" marR="0" lvl="0" indent="-171450" algn="l" defTabSz="914400" rtl="0" eaLnBrk="1" fontAlgn="auto" latinLnBrk="0" hangingPunct="1">
               <a:lnSpc>
                 <a:spcPct val="100000"/>
               </a:lnSpc>
@@ -2503,8 +3953,8 @@
               </a:spcAft>
               <a:buClrTx/>
               <a:buSzTx/>
-              <a:buFont typeface="Arial" panose="020B0604020202020204" pitchFamily="34" charset="0"/>
-              <a:buNone/>
+              <a:buFontTx/>
+              <a:buChar char="-"/>
               <a:tabLst/>
               <a:defRPr/>
             </a:pPr>
@@ -2518,23 +3968,132 @@
                 <a:ea typeface="+mn-ea"/>
                 <a:cs typeface="+mn-cs"/>
               </a:rPr>
-              <a:t>For each day, a weighted adjacency matrix was constructed with all the nodes as columns and rows. The weight was equivalent to the number of transactions between the nodes. For example, user 1 had 100 transactions with user 2, 200 transactions with user 3, and 50 transactions with user 4. This weighted adjacency matrix was then rearranged into a long vector and then all the snapshot vectors were concatenated into a matrix.</a:t>
-            </a:r>
-            <a:endParaRPr lang="en-US" sz="1200" kern="1200" dirty="0">
-              <a:solidFill>
-                <a:schemeClr val="tx1"/>
-              </a:solidFill>
-              <a:effectLst/>
-              <a:latin typeface="+mn-lt"/>
-              <a:ea typeface="+mn-ea"/>
-              <a:cs typeface="+mn-cs"/>
-            </a:endParaRPr>
-          </a:p>
-          <a:p>
-            <a:pPr marL="0" indent="0">
-              <a:buFont typeface="Arial" panose="020B0604020202020204" pitchFamily="34" charset="0"/>
-              <a:buNone/>
+              <a:t>To further elaborate on the daily snapshot:</a:t>
+            </a:r>
+          </a:p>
+          <a:p>
+            <a:pPr marL="628650" marR="0" lvl="1" indent="-171450" algn="l" defTabSz="914400" rtl="0" eaLnBrk="1" fontAlgn="auto" latinLnBrk="0" hangingPunct="1">
+              <a:lnSpc>
+                <a:spcPct val="100000"/>
+              </a:lnSpc>
+              <a:spcBef>
+                <a:spcPts val="0"/>
+              </a:spcBef>
+              <a:spcAft>
+                <a:spcPts val="0"/>
+              </a:spcAft>
+              <a:buClrTx/>
+              <a:buSzTx/>
+              <a:buFontTx/>
+              <a:buChar char="-"/>
+              <a:tabLst/>
+              <a:defRPr/>
             </a:pPr>
+            <a:r>
+              <a:rPr lang="en-CA" sz="1200" kern="1200" dirty="0">
+                <a:solidFill>
+                  <a:schemeClr val="tx1"/>
+                </a:solidFill>
+                <a:effectLst/>
+                <a:latin typeface="+mn-lt"/>
+                <a:ea typeface="+mn-ea"/>
+                <a:cs typeface="+mn-cs"/>
+              </a:rPr>
+              <a:t>A weighted adjacency matrix was constructed for each day with all the nodes as columns and rows. </a:t>
+            </a:r>
+          </a:p>
+          <a:p>
+            <a:pPr marL="628650" marR="0" lvl="1" indent="-171450" algn="l" defTabSz="914400" rtl="0" eaLnBrk="1" fontAlgn="auto" latinLnBrk="0" hangingPunct="1">
+              <a:lnSpc>
+                <a:spcPct val="100000"/>
+              </a:lnSpc>
+              <a:spcBef>
+                <a:spcPts val="0"/>
+              </a:spcBef>
+              <a:spcAft>
+                <a:spcPts val="0"/>
+              </a:spcAft>
+              <a:buClrTx/>
+              <a:buSzTx/>
+              <a:buFontTx/>
+              <a:buChar char="-"/>
+              <a:tabLst/>
+              <a:defRPr/>
+            </a:pPr>
+            <a:r>
+              <a:rPr lang="en-CA" sz="1200" kern="1200" dirty="0">
+                <a:solidFill>
+                  <a:schemeClr val="tx1"/>
+                </a:solidFill>
+                <a:effectLst/>
+                <a:latin typeface="+mn-lt"/>
+                <a:ea typeface="+mn-ea"/>
+                <a:cs typeface="+mn-cs"/>
+              </a:rPr>
+              <a:t>The weight was equivalent the number of transactions between the nodes.</a:t>
+            </a:r>
+          </a:p>
+          <a:p>
+            <a:pPr marL="628650" marR="0" lvl="1" indent="-171450" algn="l" defTabSz="914400" rtl="0" eaLnBrk="1" fontAlgn="auto" latinLnBrk="0" hangingPunct="1">
+              <a:lnSpc>
+                <a:spcPct val="100000"/>
+              </a:lnSpc>
+              <a:spcBef>
+                <a:spcPts val="0"/>
+              </a:spcBef>
+              <a:spcAft>
+                <a:spcPts val="0"/>
+              </a:spcAft>
+              <a:buClrTx/>
+              <a:buSzTx/>
+              <a:buFontTx/>
+              <a:buChar char="-"/>
+              <a:tabLst/>
+              <a:defRPr/>
+            </a:pPr>
+            <a:r>
+              <a:rPr lang="en-CA" sz="1200" kern="1200" dirty="0">
+                <a:solidFill>
+                  <a:schemeClr val="tx1"/>
+                </a:solidFill>
+                <a:effectLst/>
+                <a:latin typeface="+mn-lt"/>
+                <a:ea typeface="+mn-ea"/>
+                <a:cs typeface="+mn-cs"/>
+              </a:rPr>
+              <a:t>For example, here user 1 had 1000 transactions with user 2, 200 with user, 3 and 50 with user 4</a:t>
+            </a:r>
+          </a:p>
+          <a:p>
+            <a:pPr marL="171450" marR="0" lvl="0" indent="-171450" algn="l" defTabSz="914400" rtl="0" eaLnBrk="1" fontAlgn="auto" latinLnBrk="0" hangingPunct="1">
+              <a:lnSpc>
+                <a:spcPct val="100000"/>
+              </a:lnSpc>
+              <a:spcBef>
+                <a:spcPts val="0"/>
+              </a:spcBef>
+              <a:spcAft>
+                <a:spcPts val="0"/>
+              </a:spcAft>
+              <a:buClrTx/>
+              <a:buSzTx/>
+              <a:buFontTx/>
+              <a:buChar char="-"/>
+              <a:tabLst/>
+              <a:defRPr/>
+            </a:pPr>
+            <a:r>
+              <a:rPr lang="en-CA" sz="1200" kern="1200" dirty="0">
+                <a:solidFill>
+                  <a:schemeClr val="tx1"/>
+                </a:solidFill>
+                <a:effectLst/>
+                <a:latin typeface="+mn-lt"/>
+                <a:ea typeface="+mn-ea"/>
+                <a:cs typeface="+mn-cs"/>
+              </a:rPr>
+              <a:t>The generated matrix was rearranged into a vector and all the daily snapshot vectors were concatenated to create a matrix</a:t>
+            </a:r>
             <a:endParaRPr lang="en-CA" dirty="0"/>
           </a:p>
         </p:txBody>
@@ -10831,7 +12390,7 @@
         <p:spPr>
           <a:xfrm>
             <a:off x="779578" y="1190266"/>
-            <a:ext cx="10240128" cy="5355312"/>
+            <a:ext cx="10240128" cy="4985980"/>
           </a:xfrm>
           <a:prstGeom prst="rect">
             <a:avLst/>
@@ -10910,7 +12469,7 @@
             </a:pPr>
             <a:r>
               <a:rPr lang="en-CA" sz="2400" dirty="0"/>
-              <a:t>Anonymous users</a:t>
+              <a:t>Transparent</a:t>
             </a:r>
           </a:p>
           <a:p>
@@ -10920,7 +12479,17 @@
             </a:pPr>
             <a:r>
               <a:rPr lang="en-CA" sz="2400" dirty="0"/>
-              <a:t>Bitcoin accounts are anonymous ‘addresses’</a:t>
+              <a:t>General ledger in the form of a Blockchain available to all users</a:t>
+            </a:r>
+          </a:p>
+          <a:p>
+            <a:pPr marL="285750" indent="-285750">
+              <a:buFont typeface="Arial" panose="020B0604020202020204" pitchFamily="34" charset="0"/>
+              <a:buChar char="•"/>
+            </a:pPr>
+            <a:r>
+              <a:rPr lang="en-CA" sz="2400" dirty="0"/>
+              <a:t>Anonymous users</a:t>
             </a:r>
           </a:p>
           <a:p>
@@ -10930,17 +12499,7 @@
             </a:pPr>
             <a:r>
               <a:rPr lang="en-CA" sz="2400" dirty="0"/>
-              <a:t>Users can have multiple addresses to protect their identity</a:t>
-            </a:r>
-          </a:p>
-          <a:p>
-            <a:pPr marL="285750" indent="-285750">
-              <a:buFont typeface="Arial" panose="020B0604020202020204" pitchFamily="34" charset="0"/>
-              <a:buChar char="•"/>
-            </a:pPr>
-            <a:r>
-              <a:rPr lang="en-CA" sz="2400" dirty="0"/>
-              <a:t>Transparent</a:t>
+              <a:t>Bitcoin accounts are anonymous ‘addresses’</a:t>
             </a:r>
           </a:p>
           <a:p>
@@ -10950,17 +12509,7 @@
             </a:pPr>
             <a:r>
               <a:rPr lang="en-CA" sz="2400" dirty="0"/>
-              <a:t>General ledger in the form of a Blockchain available to all users</a:t>
-            </a:r>
-          </a:p>
-          <a:p>
-            <a:pPr marL="742950" lvl="1" indent="-285750">
-              <a:buFont typeface="Arial" panose="020B0604020202020204" pitchFamily="34" charset="0"/>
-              <a:buChar char="•"/>
-            </a:pPr>
-            <a:r>
-              <a:rPr lang="en-CA" sz="2400" dirty="0"/>
-              <a:t>Everyone knows how much Bitcoins belong to one address</a:t>
+              <a:t>Users can have multiple addresses to protect their identity</a:t>
             </a:r>
           </a:p>
           <a:p>
@@ -12098,7 +13647,6 @@
               <a:rPr lang="en-CA" sz="2400" dirty="0"/>
               <a:t>Users associated with the Satoshi gambling site</a:t>
             </a:r>
-            <a:endParaRPr lang="en-CA" sz="2400" dirty="0"/>
           </a:p>
         </p:txBody>
       </p:sp>

</xml_diff>

<commit_message>
Updated presentation and added pca test code in Python
</commit_message>
<xml_diff>
--- a/project/ethereum/presentation/Paper Presentation.pptx
+++ b/project/ethereum/presentation/Paper Presentation.pptx
@@ -5,10 +5,10 @@
     <p:sldMasterId id="2147483862" r:id="rId1"/>
   </p:sldMasterIdLst>
   <p:notesMasterIdLst>
-    <p:notesMasterId r:id="rId16"/>
+    <p:notesMasterId r:id="rId17"/>
   </p:notesMasterIdLst>
   <p:handoutMasterIdLst>
-    <p:handoutMasterId r:id="rId17"/>
+    <p:handoutMasterId r:id="rId18"/>
   </p:handoutMasterIdLst>
   <p:sldIdLst>
     <p:sldId id="256" r:id="rId2"/>
@@ -25,6 +25,7 @@
     <p:sldId id="359" r:id="rId13"/>
     <p:sldId id="332" r:id="rId14"/>
     <p:sldId id="340" r:id="rId15"/>
+    <p:sldId id="361" r:id="rId16"/>
   </p:sldIdLst>
   <p:sldSz cx="12192000" cy="6858000"/>
   <p:notesSz cx="6858000" cy="9144000"/>
@@ -241,7 +242,7 @@
           <a:p>
             <a:fld id="{830F91E2-D5E8-4059-BD7B-1A24CC10B437}" type="datetimeFigureOut">
               <a:rPr lang="en-CA" smtClean="0"/>
-              <a:t>2017-04-03</a:t>
+              <a:t>2017-04-04</a:t>
             </a:fld>
             <a:endParaRPr lang="en-CA"/>
           </a:p>
@@ -407,7 +408,7 @@
           <a:p>
             <a:fld id="{F1C14C08-6290-480B-BEA9-63276025D411}" type="datetimeFigureOut">
               <a:rPr lang="en-CA" smtClean="0"/>
-              <a:t>2017-04-03</a:t>
+              <a:t>2017-04-04</a:t>
             </a:fld>
             <a:endParaRPr lang="en-CA"/>
           </a:p>
@@ -1790,6 +1791,94 @@
 </p:notes>
 </file>
 
+<file path=ppt/notesSlides/notesSlide15.xml><?xml version="1.0" encoding="utf-8"?>
+<p:notes xmlns:a="http://schemas.openxmlformats.org/drawingml/2006/main" xmlns:r="http://schemas.openxmlformats.org/officeDocument/2006/relationships" xmlns:p="http://schemas.openxmlformats.org/presentationml/2006/main">
+  <p:cSld>
+    <p:spTree>
+      <p:nvGrpSpPr>
+        <p:cNvPr id="1" name=""/>
+        <p:cNvGrpSpPr/>
+        <p:nvPr/>
+      </p:nvGrpSpPr>
+      <p:grpSpPr>
+        <a:xfrm>
+          <a:off x="0" y="0"/>
+          <a:ext cx="0" cy="0"/>
+          <a:chOff x="0" y="0"/>
+          <a:chExt cx="0" cy="0"/>
+        </a:xfrm>
+      </p:grpSpPr>
+      <p:sp>
+        <p:nvSpPr>
+          <p:cNvPr id="2" name="Slide Image Placeholder 1"/>
+          <p:cNvSpPr>
+            <a:spLocks noGrp="1" noRot="1" noChangeAspect="1"/>
+          </p:cNvSpPr>
+          <p:nvPr>
+            <p:ph type="sldImg"/>
+          </p:nvPr>
+        </p:nvSpPr>
+        <p:spPr/>
+      </p:sp>
+      <p:sp>
+        <p:nvSpPr>
+          <p:cNvPr id="3" name="Notes Placeholder 2"/>
+          <p:cNvSpPr>
+            <a:spLocks noGrp="1"/>
+          </p:cNvSpPr>
+          <p:nvPr>
+            <p:ph type="body" idx="1"/>
+          </p:nvPr>
+        </p:nvSpPr>
+        <p:spPr/>
+        <p:txBody>
+          <a:bodyPr/>
+          <a:lstStyle/>
+          <a:p>
+            <a:pPr marL="0" indent="0">
+              <a:buFont typeface="Arial" panose="020B0604020202020204" pitchFamily="34" charset="0"/>
+              <a:buNone/>
+            </a:pPr>
+            <a:endParaRPr lang="en-CA" dirty="0"/>
+          </a:p>
+        </p:txBody>
+      </p:sp>
+      <p:sp>
+        <p:nvSpPr>
+          <p:cNvPr id="5" name="Slide Number Placeholder 4"/>
+          <p:cNvSpPr>
+            <a:spLocks noGrp="1"/>
+          </p:cNvSpPr>
+          <p:nvPr>
+            <p:ph type="sldNum" sz="quarter" idx="10"/>
+          </p:nvPr>
+        </p:nvSpPr>
+        <p:spPr/>
+        <p:txBody>
+          <a:bodyPr/>
+          <a:lstStyle/>
+          <a:p>
+            <a:fld id="{A8698859-8636-4793-AB41-B87E25EB3BE1}" type="slidenum">
+              <a:rPr lang="en-CA" smtClean="0"/>
+              <a:t>15</a:t>
+            </a:fld>
+            <a:endParaRPr lang="en-CA"/>
+          </a:p>
+        </p:txBody>
+      </p:sp>
+    </p:spTree>
+    <p:extLst>
+      <p:ext uri="{BB962C8B-B14F-4D97-AF65-F5344CB8AC3E}">
+        <p14:creationId xmlns:p14="http://schemas.microsoft.com/office/powerpoint/2010/main" val="447493125"/>
+      </p:ext>
+    </p:extLst>
+  </p:cSld>
+  <p:clrMapOvr>
+    <a:masterClrMapping/>
+  </p:clrMapOvr>
+</p:notes>
+</file>
+
 <file path=ppt/notesSlides/notesSlide2.xml><?xml version="1.0" encoding="utf-8"?>
 <p:notes xmlns:a="http://schemas.openxmlformats.org/drawingml/2006/main" xmlns:r="http://schemas.openxmlformats.org/officeDocument/2006/relationships" xmlns:p="http://schemas.openxmlformats.org/presentationml/2006/main">
   <p:cSld>
@@ -4358,7 +4447,7 @@
           <a:p>
             <a:fld id="{816B9DC3-3FDA-4BF0-A9E3-B8C948DB5BE1}" type="datetime1">
               <a:rPr lang="en-US" smtClean="0"/>
-              <a:t>4/3/2017</a:t>
+              <a:t>4/4/2017</a:t>
             </a:fld>
             <a:endParaRPr lang="en-US" dirty="0"/>
           </a:p>
@@ -4692,7 +4781,7 @@
           <a:p>
             <a:fld id="{02C98B62-764C-45E4-8F17-4082656A7370}" type="datetime1">
               <a:rPr lang="en-US" smtClean="0"/>
-              <a:t>4/3/2017</a:t>
+              <a:t>4/4/2017</a:t>
             </a:fld>
             <a:endParaRPr lang="en-US" dirty="0"/>
           </a:p>
@@ -4970,7 +5059,7 @@
           <a:p>
             <a:fld id="{9EDC7BCF-A34D-4CDB-A997-29E682C19CE7}" type="datetime1">
               <a:rPr lang="en-US" smtClean="0"/>
-              <a:t>4/3/2017</a:t>
+              <a:t>4/4/2017</a:t>
             </a:fld>
             <a:endParaRPr lang="en-US" dirty="0"/>
           </a:p>
@@ -5538,7 +5627,7 @@
           <a:p>
             <a:fld id="{FC4B892A-651B-4683-BBF5-A7E9EC677247}" type="datetime1">
               <a:rPr lang="en-US" smtClean="0"/>
-              <a:t>4/3/2017</a:t>
+              <a:t>4/4/2017</a:t>
             </a:fld>
             <a:endParaRPr lang="en-US" dirty="0"/>
           </a:p>
@@ -5816,7 +5905,7 @@
           <a:p>
             <a:fld id="{02A07B41-71A8-4B71-84A3-DA50DF83887F}" type="datetime1">
               <a:rPr lang="en-US" smtClean="0"/>
-              <a:t>4/3/2017</a:t>
+              <a:t>4/4/2017</a:t>
             </a:fld>
             <a:endParaRPr lang="en-US" dirty="0"/>
           </a:p>
@@ -6378,7 +6467,7 @@
           <a:p>
             <a:fld id="{64B87559-6D01-4691-80A1-B78B151308DD}" type="datetime1">
               <a:rPr lang="en-US" smtClean="0"/>
-              <a:t>4/3/2017</a:t>
+              <a:t>4/4/2017</a:t>
             </a:fld>
             <a:endParaRPr lang="en-US" dirty="0"/>
           </a:p>
@@ -6705,7 +6794,7 @@
           <a:p>
             <a:fld id="{68BAC94E-384C-4FE2-8CFD-2965D9C29AAD}" type="datetime1">
               <a:rPr lang="en-US" smtClean="0"/>
-              <a:t>4/3/2017</a:t>
+              <a:t>4/4/2017</a:t>
             </a:fld>
             <a:endParaRPr lang="en-US" dirty="0"/>
           </a:p>
@@ -6882,7 +6971,7 @@
           <a:p>
             <a:fld id="{284A070B-36D6-4E36-9CAF-89E01F51CC67}" type="datetime1">
               <a:rPr lang="en-US" smtClean="0"/>
-              <a:t>4/3/2017</a:t>
+              <a:t>4/4/2017</a:t>
             </a:fld>
             <a:endParaRPr lang="en-US" dirty="0"/>
           </a:p>
@@ -7120,7 +7209,7 @@
           <a:p>
             <a:fld id="{B2A28BD1-19CF-4968-A111-E6D5229776CC}" type="datetime1">
               <a:rPr lang="en-US" smtClean="0"/>
-              <a:t>4/3/2017</a:t>
+              <a:t>4/4/2017</a:t>
             </a:fld>
             <a:endParaRPr lang="en-US" dirty="0"/>
           </a:p>
@@ -7320,7 +7409,7 @@
           <a:p>
             <a:fld id="{AA967871-14A2-4039-8129-32B9D15BC95F}" type="datetime1">
               <a:rPr lang="en-US" smtClean="0"/>
-              <a:t>4/3/2017</a:t>
+              <a:t>4/4/2017</a:t>
             </a:fld>
             <a:endParaRPr lang="en-US" dirty="0"/>
           </a:p>
@@ -7596,7 +7685,7 @@
           <a:p>
             <a:fld id="{6517A602-A45A-49D2-B9FC-F1DB40B1A9AD}" type="datetime1">
               <a:rPr lang="en-US" smtClean="0"/>
-              <a:t>4/3/2017</a:t>
+              <a:t>4/4/2017</a:t>
             </a:fld>
             <a:endParaRPr lang="en-US" dirty="0"/>
           </a:p>
@@ -7862,7 +7951,7 @@
           <a:p>
             <a:fld id="{300FC77B-7DFC-487F-9C32-FA1B4212CD33}" type="datetime1">
               <a:rPr lang="en-US" smtClean="0"/>
-              <a:t>4/3/2017</a:t>
+              <a:t>4/4/2017</a:t>
             </a:fld>
             <a:endParaRPr lang="en-US" dirty="0"/>
           </a:p>
@@ -8241,7 +8330,7 @@
           <a:p>
             <a:fld id="{2D7A8EBE-2D79-458E-AC99-E23DDC76C657}" type="datetime1">
               <a:rPr lang="en-US" smtClean="0"/>
-              <a:t>4/3/2017</a:t>
+              <a:t>4/4/2017</a:t>
             </a:fld>
             <a:endParaRPr lang="en-US" dirty="0"/>
           </a:p>
@@ -8394,7 +8483,7 @@
           <a:p>
             <a:fld id="{1A082145-3460-40A9-B27F-81FE51633B8E}" type="datetime1">
               <a:rPr lang="en-US" smtClean="0"/>
-              <a:t>4/3/2017</a:t>
+              <a:t>4/4/2017</a:t>
             </a:fld>
             <a:endParaRPr lang="en-US" dirty="0"/>
           </a:p>
@@ -8519,7 +8608,7 @@
           <a:p>
             <a:fld id="{C68BA5C3-7540-42CF-8BFA-408BD4B1C0B3}" type="datetime1">
               <a:rPr lang="en-US" smtClean="0"/>
-              <a:t>4/3/2017</a:t>
+              <a:t>4/4/2017</a:t>
             </a:fld>
             <a:endParaRPr lang="en-US" dirty="0"/>
           </a:p>
@@ -8804,7 +8893,7 @@
           <a:p>
             <a:fld id="{68BC9566-B215-4227-AC56-E382CABC5881}" type="datetime1">
               <a:rPr lang="en-US" smtClean="0"/>
-              <a:t>4/3/2017</a:t>
+              <a:t>4/4/2017</a:t>
             </a:fld>
             <a:endParaRPr lang="en-US" dirty="0"/>
           </a:p>
@@ -9133,7 +9222,7 @@
           <a:p>
             <a:fld id="{B321B58E-0686-44CB-9F84-202FBF960F01}" type="datetime1">
               <a:rPr lang="en-US" smtClean="0"/>
-              <a:t>4/3/2017</a:t>
+              <a:t>4/4/2017</a:t>
             </a:fld>
             <a:endParaRPr lang="en-US" dirty="0"/>
           </a:p>
@@ -9370,7 +9459,7 @@
           <a:p>
             <a:fld id="{90131094-FC47-4958-969E-A651066AD8D7}" type="datetime1">
               <a:rPr lang="en-US" smtClean="0"/>
-              <a:t>4/3/2017</a:t>
+              <a:t>4/4/2017</a:t>
             </a:fld>
             <a:endParaRPr lang="en-US" dirty="0"/>
           </a:p>
@@ -10337,60 +10426,6 @@
           </a:p>
         </p:txBody>
       </p:sp>
-      <p:sp>
-        <p:nvSpPr>
-          <p:cNvPr id="14" name="Footer Placeholder 5"/>
-          <p:cNvSpPr>
-            <a:spLocks noGrp="1"/>
-          </p:cNvSpPr>
-          <p:nvPr>
-            <p:ph type="ftr" sz="quarter" idx="11"/>
-          </p:nvPr>
-        </p:nvSpPr>
-        <p:spPr>
-          <a:xfrm>
-            <a:off x="770137" y="6394275"/>
-            <a:ext cx="7827963" cy="377825"/>
-          </a:xfrm>
-        </p:spPr>
-        <p:txBody>
-          <a:bodyPr/>
-          <a:lstStyle/>
-          <a:p>
-            <a:r>
-              <a:rPr lang="en-US" u="sng" dirty="0">
-                <a:hlinkClick r:id="rId5"/>
-              </a:rPr>
-              <a:t>https://pdfs.semanticscholar.org/53b9/966a0333c9c9198cdf03efc073e991647c12.pdf</a:t>
-            </a:r>
-            <a:endParaRPr lang="en-US" u="sng" dirty="0"/>
-          </a:p>
-          <a:p>
-            <a:r>
-              <a:rPr lang="en-US" dirty="0">
-                <a:hlinkClick r:id="rId6"/>
-              </a:rPr>
-              <a:t>http://stats.stackexchange.com/questions/2691/making-sense-of-principal-component-analysis-eigenvectors-eigenvalues</a:t>
-            </a:r>
-            <a:r>
-              <a:rPr lang="en-US" dirty="0"/>
-              <a:t> </a:t>
-            </a:r>
-            <a:endParaRPr lang="en-US" dirty="0">
-              <a:solidFill>
-                <a:schemeClr val="bg1"/>
-              </a:solidFill>
-            </a:endParaRPr>
-          </a:p>
-          <a:p>
-            <a:endParaRPr lang="en-US" dirty="0">
-              <a:solidFill>
-                <a:schemeClr val="bg1"/>
-              </a:solidFill>
-            </a:endParaRPr>
-          </a:p>
-        </p:txBody>
-      </p:sp>
       <p:pic>
         <p:nvPicPr>
           <p:cNvPr id="5" name="Picture 4"/>
@@ -10400,7 +10435,7 @@
           <p:nvPr/>
         </p:nvPicPr>
         <p:blipFill>
-          <a:blip r:embed="rId7"/>
+          <a:blip r:embed="rId5"/>
           <a:stretch>
             <a:fillRect/>
           </a:stretch>
@@ -10415,6 +10450,133 @@
           </a:prstGeom>
         </p:spPr>
       </p:pic>
+      <p:sp>
+        <p:nvSpPr>
+          <p:cNvPr id="12" name="Footer Placeholder 5"/>
+          <p:cNvSpPr txBox="1">
+            <a:spLocks/>
+          </p:cNvSpPr>
+          <p:nvPr/>
+        </p:nvSpPr>
+        <p:spPr>
+          <a:xfrm>
+            <a:off x="685801" y="6327775"/>
+            <a:ext cx="7827659" cy="377825"/>
+          </a:xfrm>
+          <a:prstGeom prst="rect">
+            <a:avLst/>
+          </a:prstGeom>
+        </p:spPr>
+        <p:txBody>
+          <a:bodyPr vert="horz" lIns="91440" tIns="45720" rIns="91440" bIns="45720" rtlCol="0" anchor="ctr"/>
+          <a:lstStyle>
+            <a:defPPr>
+              <a:defRPr lang="en-US"/>
+            </a:defPPr>
+            <a:lvl1pPr marL="0" algn="l" defTabSz="457200" rtl="0" eaLnBrk="1" latinLnBrk="0" hangingPunct="1">
+              <a:defRPr sz="1000" b="0" i="0" kern="1200">
+                <a:solidFill>
+                  <a:schemeClr val="tx1"/>
+                </a:solidFill>
+                <a:effectLst/>
+                <a:latin typeface="+mn-lt"/>
+                <a:ea typeface="+mn-ea"/>
+                <a:cs typeface="+mn-cs"/>
+              </a:defRPr>
+            </a:lvl1pPr>
+            <a:lvl2pPr marL="457200" algn="l" defTabSz="457200" rtl="0" eaLnBrk="1" latinLnBrk="0" hangingPunct="1">
+              <a:defRPr sz="1800" kern="1200">
+                <a:solidFill>
+                  <a:schemeClr val="tx1"/>
+                </a:solidFill>
+                <a:latin typeface="+mn-lt"/>
+                <a:ea typeface="+mn-ea"/>
+                <a:cs typeface="+mn-cs"/>
+              </a:defRPr>
+            </a:lvl2pPr>
+            <a:lvl3pPr marL="914400" algn="l" defTabSz="457200" rtl="0" eaLnBrk="1" latinLnBrk="0" hangingPunct="1">
+              <a:defRPr sz="1800" kern="1200">
+                <a:solidFill>
+                  <a:schemeClr val="tx1"/>
+                </a:solidFill>
+                <a:latin typeface="+mn-lt"/>
+                <a:ea typeface="+mn-ea"/>
+                <a:cs typeface="+mn-cs"/>
+              </a:defRPr>
+            </a:lvl3pPr>
+            <a:lvl4pPr marL="1371600" algn="l" defTabSz="457200" rtl="0" eaLnBrk="1" latinLnBrk="0" hangingPunct="1">
+              <a:defRPr sz="1800" kern="1200">
+                <a:solidFill>
+                  <a:schemeClr val="tx1"/>
+                </a:solidFill>
+                <a:latin typeface="+mn-lt"/>
+                <a:ea typeface="+mn-ea"/>
+                <a:cs typeface="+mn-cs"/>
+              </a:defRPr>
+            </a:lvl4pPr>
+            <a:lvl5pPr marL="1828800" algn="l" defTabSz="457200" rtl="0" eaLnBrk="1" latinLnBrk="0" hangingPunct="1">
+              <a:defRPr sz="1800" kern="1200">
+                <a:solidFill>
+                  <a:schemeClr val="tx1"/>
+                </a:solidFill>
+                <a:latin typeface="+mn-lt"/>
+                <a:ea typeface="+mn-ea"/>
+                <a:cs typeface="+mn-cs"/>
+              </a:defRPr>
+            </a:lvl5pPr>
+            <a:lvl6pPr marL="2286000" algn="l" defTabSz="457200" rtl="0" eaLnBrk="1" latinLnBrk="0" hangingPunct="1">
+              <a:defRPr sz="1800" kern="1200">
+                <a:solidFill>
+                  <a:schemeClr val="tx1"/>
+                </a:solidFill>
+                <a:latin typeface="+mn-lt"/>
+                <a:ea typeface="+mn-ea"/>
+                <a:cs typeface="+mn-cs"/>
+              </a:defRPr>
+            </a:lvl6pPr>
+            <a:lvl7pPr marL="2743200" algn="l" defTabSz="457200" rtl="0" eaLnBrk="1" latinLnBrk="0" hangingPunct="1">
+              <a:defRPr sz="1800" kern="1200">
+                <a:solidFill>
+                  <a:schemeClr val="tx1"/>
+                </a:solidFill>
+                <a:latin typeface="+mn-lt"/>
+                <a:ea typeface="+mn-ea"/>
+                <a:cs typeface="+mn-cs"/>
+              </a:defRPr>
+            </a:lvl7pPr>
+            <a:lvl8pPr marL="3200400" algn="l" defTabSz="457200" rtl="0" eaLnBrk="1" latinLnBrk="0" hangingPunct="1">
+              <a:defRPr sz="1800" kern="1200">
+                <a:solidFill>
+                  <a:schemeClr val="tx1"/>
+                </a:solidFill>
+                <a:latin typeface="+mn-lt"/>
+                <a:ea typeface="+mn-ea"/>
+                <a:cs typeface="+mn-cs"/>
+              </a:defRPr>
+            </a:lvl8pPr>
+            <a:lvl9pPr marL="3657600" algn="l" defTabSz="457200" rtl="0" eaLnBrk="1" latinLnBrk="0" hangingPunct="1">
+              <a:defRPr sz="1800" kern="1200">
+                <a:solidFill>
+                  <a:schemeClr val="tx1"/>
+                </a:solidFill>
+                <a:latin typeface="+mn-lt"/>
+                <a:ea typeface="+mn-ea"/>
+                <a:cs typeface="+mn-cs"/>
+              </a:defRPr>
+            </a:lvl9pPr>
+          </a:lstStyle>
+          <a:p>
+            <a:r>
+              <a:rPr lang="en-US" sz="1600" dirty="0">
+                <a:solidFill>
+                  <a:schemeClr val="bg1"/>
+                </a:solidFill>
+              </a:rPr>
+              <a:t>[1], [2], [8], [9]</a:t>
+            </a:r>
+          </a:p>
+        </p:txBody>
+      </p:sp>
     </p:spTree>
     <p:extLst>
       <p:ext uri="{BB962C8B-B14F-4D97-AF65-F5344CB8AC3E}">
@@ -10712,6 +10874,37 @@
           </a:p>
         </p:txBody>
       </p:sp>
+      <p:sp>
+        <p:nvSpPr>
+          <p:cNvPr id="14" name="Footer Placeholder 5"/>
+          <p:cNvSpPr>
+            <a:spLocks noGrp="1"/>
+          </p:cNvSpPr>
+          <p:nvPr>
+            <p:ph type="ftr" sz="quarter" idx="11"/>
+          </p:nvPr>
+        </p:nvSpPr>
+        <p:spPr>
+          <a:xfrm>
+            <a:off x="685801" y="6327775"/>
+            <a:ext cx="7827659" cy="377825"/>
+          </a:xfrm>
+        </p:spPr>
+        <p:txBody>
+          <a:bodyPr/>
+          <a:lstStyle/>
+          <a:p>
+            <a:r>
+              <a:rPr lang="en-US" sz="1600" dirty="0">
+                <a:solidFill>
+                  <a:schemeClr val="bg1"/>
+                </a:solidFill>
+              </a:rPr>
+              <a:t>[1], [2]</a:t>
+            </a:r>
+          </a:p>
+        </p:txBody>
+      </p:sp>
     </p:spTree>
     <p:extLst>
       <p:ext uri="{BB962C8B-B14F-4D97-AF65-F5344CB8AC3E}">
@@ -11010,37 +11203,6 @@
           </a:p>
         </p:txBody>
       </p:sp>
-      <p:sp>
-        <p:nvSpPr>
-          <p:cNvPr id="14" name="Footer Placeholder 5"/>
-          <p:cNvSpPr>
-            <a:spLocks noGrp="1"/>
-          </p:cNvSpPr>
-          <p:nvPr>
-            <p:ph type="ftr" sz="quarter" idx="11"/>
-          </p:nvPr>
-        </p:nvSpPr>
-        <p:spPr>
-          <a:xfrm>
-            <a:off x="685800" y="6327775"/>
-            <a:ext cx="7827963" cy="377825"/>
-          </a:xfrm>
-        </p:spPr>
-        <p:txBody>
-          <a:bodyPr/>
-          <a:lstStyle/>
-          <a:p>
-            <a:r>
-              <a:rPr lang="en-US" dirty="0">
-                <a:solidFill>
-                  <a:schemeClr val="bg1"/>
-                </a:solidFill>
-              </a:rPr>
-              <a:t>https://www.ethereum.org/images/logos/ETHEREUM-LOGO_LANDSCAPE_Black.png</a:t>
-            </a:r>
-          </a:p>
-        </p:txBody>
-      </p:sp>
       <p:pic>
         <p:nvPicPr>
           <p:cNvPr id="3" name="Picture 2"/>
@@ -11083,6 +11245,37 @@
           </a:sp3d>
         </p:spPr>
       </p:pic>
+      <p:sp>
+        <p:nvSpPr>
+          <p:cNvPr id="17" name="Footer Placeholder 5"/>
+          <p:cNvSpPr>
+            <a:spLocks noGrp="1"/>
+          </p:cNvSpPr>
+          <p:nvPr>
+            <p:ph type="ftr" sz="quarter" idx="11"/>
+          </p:nvPr>
+        </p:nvSpPr>
+        <p:spPr>
+          <a:xfrm>
+            <a:off x="685801" y="6327775"/>
+            <a:ext cx="7827659" cy="377825"/>
+          </a:xfrm>
+        </p:spPr>
+        <p:txBody>
+          <a:bodyPr/>
+          <a:lstStyle/>
+          <a:p>
+            <a:r>
+              <a:rPr lang="en-US" sz="1600" dirty="0">
+                <a:solidFill>
+                  <a:schemeClr val="bg1"/>
+                </a:solidFill>
+              </a:rPr>
+              <a:t>[1], [2], [10]</a:t>
+            </a:r>
+          </a:p>
+        </p:txBody>
+      </p:sp>
     </p:spTree>
     <p:extLst>
       <p:ext uri="{BB962C8B-B14F-4D97-AF65-F5344CB8AC3E}">
@@ -11209,7 +11402,7 @@
           <a:p>
             <a:r>
               <a:rPr lang="en-CA" dirty="0"/>
-              <a:t>9.0 References</a:t>
+              <a:t>9.0 References p.1</a:t>
             </a:r>
           </a:p>
         </p:txBody>
@@ -11357,7 +11550,7 @@
         <p:spPr>
           <a:xfrm>
             <a:off x="770137" y="1163734"/>
-            <a:ext cx="10240128" cy="3416320"/>
+            <a:ext cx="10240128" cy="4493538"/>
           </a:xfrm>
           <a:prstGeom prst="rect">
             <a:avLst/>
@@ -11371,195 +11564,165 @@
           <a:lstStyle/>
           <a:p>
             <a:r>
-              <a:rPr lang="en-CA" dirty="0">
+              <a:rPr lang="en-CA" sz="2000" dirty="0">
                 <a:latin typeface="Calibri (Body)"/>
               </a:rPr>
               <a:t>[1] </a:t>
             </a:r>
             <a:r>
-              <a:rPr lang="en-US" dirty="0">
+              <a:rPr lang="en-US" sz="2000" dirty="0">
                 <a:latin typeface="Calibri (Body)"/>
               </a:rPr>
               <a:t>Kondor, Daniel, et al. “Inferring the Interplay between Network Structure and Market Effects in Bitcoin.” New Journal of Physics, vol. 16, no. 12, Feb. 2014, p. 125003., doi:10.1088/1367-2630/16/12/125003</a:t>
             </a:r>
-            <a:endParaRPr lang="en-CA" dirty="0">
-              <a:latin typeface="Calibri (Body)"/>
-            </a:endParaRPr>
-          </a:p>
-          <a:p>
-            <a:r>
-              <a:rPr lang="en-CA" dirty="0">
+          </a:p>
+          <a:p>
+            <a:r>
+              <a:rPr lang="en-US" sz="2000" dirty="0">
                 <a:latin typeface="Calibri (Body)"/>
               </a:rPr>
               <a:t>[2] </a:t>
             </a:r>
             <a:r>
-              <a:rPr lang="en-US" u="sng" dirty="0">
-                <a:latin typeface="Calibri (Body)"/>
-                <a:hlinkClick r:id="rId4"/>
-              </a:rPr>
-              <a:t>http://www.bitcoinblockhalf.com/</a:t>
-            </a:r>
-            <a:endParaRPr lang="en-US" dirty="0">
+              <a:rPr lang="en-US" sz="2000" dirty="0" err="1"/>
+              <a:t>UofT</a:t>
+            </a:r>
+            <a:r>
+              <a:rPr lang="en-US" sz="2000" dirty="0"/>
+              <a:t> Logo. Digital image. </a:t>
+            </a:r>
+            <a:r>
+              <a:rPr lang="en-US" sz="2000" i="1" dirty="0"/>
+              <a:t>Wikipedia</a:t>
+            </a:r>
+            <a:r>
+              <a:rPr lang="en-US" sz="2000" dirty="0"/>
+              <a:t>. Wikimedia Foundation, 21 Feb. 2017. Web. 3 Apr. 2017. &lt;https://en.wikipedia.org/wiki/File:UofT_Logo.svg&gt;.</a:t>
+            </a:r>
+            <a:endParaRPr lang="en-CA" sz="2000" dirty="0">
               <a:latin typeface="Calibri (Body)"/>
             </a:endParaRPr>
           </a:p>
           <a:p>
             <a:r>
-              <a:rPr lang="en-US" dirty="0">
+              <a:rPr lang="en-CA" sz="2000" dirty="0">
                 <a:latin typeface="Calibri (Body)"/>
               </a:rPr>
               <a:t>[3] </a:t>
             </a:r>
             <a:r>
-              <a:rPr lang="en-US" u="sng" dirty="0">
-                <a:latin typeface="Calibri (Body)"/>
-                <a:hlinkClick r:id="rId5"/>
-              </a:rPr>
-              <a:t>https://bitcoin.org/img/icons/opengraph.png</a:t>
-            </a:r>
-            <a:endParaRPr lang="en-US" dirty="0">
-              <a:latin typeface="Calibri (Body)"/>
-            </a:endParaRPr>
-          </a:p>
-          <a:p>
-            <a:r>
-              <a:rPr lang="en-US" dirty="0">
-                <a:latin typeface="Calibri (Body)"/>
-              </a:rPr>
-              <a:t>[4] </a:t>
-            </a:r>
-            <a:r>
-              <a:rPr lang="en-US" u="sng" dirty="0">
-                <a:latin typeface="Calibri (Body)"/>
-                <a:hlinkClick r:id="rId6"/>
-              </a:rPr>
-              <a:t>http://www.coindesk.com/information/what-is-bitcoin/</a:t>
-            </a:r>
-            <a:r>
-              <a:rPr lang="en-CA" dirty="0">
-                <a:latin typeface="Calibri (Body)"/>
-              </a:rPr>
-              <a:t> </a:t>
-            </a:r>
-            <a:endParaRPr lang="en-US" dirty="0">
-              <a:latin typeface="Calibri (Body)"/>
-            </a:endParaRPr>
-          </a:p>
-          <a:p>
-            <a:r>
-              <a:rPr lang="en-US" dirty="0">
-                <a:latin typeface="Calibri (Body)"/>
-              </a:rPr>
-              <a:t>[5] </a:t>
-            </a:r>
-            <a:r>
-              <a:rPr lang="en-CA" dirty="0">
-                <a:latin typeface="Calibri (Body)"/>
-                <a:hlinkClick r:id="rId7"/>
-              </a:rPr>
-              <a:t>http://bitcoin.stackexchange.com/questions/tagged/bitcoind</a:t>
-            </a:r>
-            <a:r>
-              <a:rPr lang="en-CA" dirty="0">
-                <a:latin typeface="Calibri (Body)"/>
-              </a:rPr>
-              <a:t> </a:t>
-            </a:r>
-            <a:endParaRPr lang="en-US" dirty="0">
-              <a:latin typeface="Calibri (Body)"/>
-            </a:endParaRPr>
-          </a:p>
-          <a:p>
-            <a:r>
-              <a:rPr lang="en-CA" dirty="0">
-                <a:latin typeface="Calibri (Body)"/>
-              </a:rPr>
-              <a:t>[6] </a:t>
-            </a:r>
-            <a:r>
-              <a:rPr lang="en-US" dirty="0">
-                <a:latin typeface="Calibri (Body)"/>
-                <a:hlinkClick r:id="rId8"/>
-              </a:rPr>
-              <a:t>http://cpsc.ualr.edu/srini/DM/chapters/review5.3.html</a:t>
-            </a:r>
-            <a:r>
-              <a:rPr lang="en-US" dirty="0">
-                <a:latin typeface="Calibri (Body)"/>
-              </a:rPr>
-              <a:t> </a:t>
-            </a:r>
-          </a:p>
-          <a:p>
-            <a:r>
-              <a:rPr lang="en-US" dirty="0">
-                <a:latin typeface="Calibri (Body)"/>
-              </a:rPr>
-              <a:t>[7] </a:t>
-            </a:r>
-            <a:r>
-              <a:rPr lang="en-US" u="sng" dirty="0">
-                <a:latin typeface="Calibri (Body)"/>
-                <a:hlinkClick r:id="rId9"/>
-              </a:rPr>
-              <a:t>https://pdfs.semanticscholar.org/53b9/966a0333c9c9198cdf03efc073e991647c12.pdf</a:t>
-            </a:r>
-            <a:endParaRPr lang="en-US" dirty="0">
-              <a:latin typeface="Calibri (Body)"/>
-            </a:endParaRPr>
-          </a:p>
-          <a:p>
-            <a:r>
-              <a:rPr lang="en-US" dirty="0">
-                <a:latin typeface="Calibri (Body)"/>
-              </a:rPr>
-              <a:t>[8] </a:t>
-            </a:r>
-            <a:r>
-              <a:rPr lang="en-US" dirty="0">
-                <a:latin typeface="Calibri (Body)"/>
-                <a:hlinkClick r:id="rId10"/>
-              </a:rPr>
-              <a:t>http://stats.stackexchange.com/questions/2691/making-sense-of-principal-component-analysis-eigenvectors-eigenvalues</a:t>
-            </a:r>
-            <a:endParaRPr lang="en-US" dirty="0">
-              <a:latin typeface="Calibri (Body)"/>
-            </a:endParaRPr>
-          </a:p>
-          <a:p>
-            <a:r>
-              <a:rPr lang="en-US" dirty="0">
-                <a:latin typeface="Calibri (Body)"/>
-              </a:rPr>
-              <a:t>[9] </a:t>
-            </a:r>
-            <a:r>
-              <a:rPr lang="en-US" dirty="0">
-                <a:latin typeface="Calibri (Body)"/>
-                <a:hlinkClick r:id="rId11"/>
-              </a:rPr>
-              <a:t>https://www.ethereum.org/images/logos/ETHEREUM-LOGO_LANDSCAPE_Black.png</a:t>
-            </a:r>
-            <a:endParaRPr lang="en-US" dirty="0">
-              <a:latin typeface="Calibri (Body)"/>
-            </a:endParaRPr>
-          </a:p>
-          <a:p>
-            <a:r>
-              <a:rPr lang="en-US" dirty="0">
-                <a:latin typeface="Calibri (Body)"/>
-              </a:rPr>
-              <a:t>[10] </a:t>
-            </a:r>
-            <a:r>
-              <a:rPr lang="en-US" dirty="0">
-                <a:latin typeface="Calibri (Body)"/>
-                <a:hlinkClick r:id="rId12"/>
-              </a:rPr>
-              <a:t>https://en.wikipedia.org/wiki/File:UofT_Logo.svg</a:t>
-            </a:r>
-            <a:endParaRPr lang="en-US" dirty="0">
+              <a:rPr lang="en-US" sz="2000" dirty="0"/>
+              <a:t>"Bitcoin Block Reward Halving Countdown." </a:t>
+            </a:r>
+            <a:r>
+              <a:rPr lang="en-US" sz="2000" i="1" dirty="0"/>
+              <a:t>Bitcoin Block Reward Halving Countdown</a:t>
+            </a:r>
+            <a:r>
+              <a:rPr lang="en-US" sz="2000" dirty="0"/>
+              <a:t>. </a:t>
+            </a:r>
+            <a:r>
+              <a:rPr lang="en-US" sz="2000" dirty="0" err="1"/>
+              <a:t>N.p</a:t>
+            </a:r>
+            <a:r>
+              <a:rPr lang="en-US" sz="2000" dirty="0"/>
+              <a:t>., </a:t>
+            </a:r>
+            <a:r>
+              <a:rPr lang="en-US" sz="2000" dirty="0" err="1"/>
+              <a:t>n.d.</a:t>
+            </a:r>
+            <a:r>
+              <a:rPr lang="en-US" sz="2000" dirty="0"/>
+              <a:t> Web. 03 Apr. 2017. &lt;http://www.bitcoinblockhalf.com/&gt;.</a:t>
+            </a:r>
+          </a:p>
+          <a:p>
+            <a:r>
+              <a:rPr lang="en-US" sz="2000" dirty="0"/>
+              <a:t>[4] Bitcoin Logo. Digital image. </a:t>
+            </a:r>
+            <a:r>
+              <a:rPr lang="en-US" sz="2000" i="1" dirty="0"/>
+              <a:t>Bitcoin</a:t>
+            </a:r>
+            <a:r>
+              <a:rPr lang="en-US" sz="2000" dirty="0"/>
+              <a:t>. Bitcoin Project, </a:t>
+            </a:r>
+            <a:r>
+              <a:rPr lang="en-US" sz="2000" dirty="0" err="1"/>
+              <a:t>n.d.</a:t>
+            </a:r>
+            <a:r>
+              <a:rPr lang="en-US" sz="2000" dirty="0"/>
+              <a:t> Web. 3 Apr. 2017. &lt;https://bitcoin.org/img/icons/opengraph.png&gt;.</a:t>
+            </a:r>
+          </a:p>
+          <a:p>
+            <a:r>
+              <a:rPr lang="en-US" sz="2000" dirty="0"/>
+              <a:t>[5] "What Is Bitcoin?" </a:t>
+            </a:r>
+            <a:r>
+              <a:rPr lang="en-US" sz="2000" i="1" dirty="0" err="1"/>
+              <a:t>CoinDesk</a:t>
+            </a:r>
+            <a:r>
+              <a:rPr lang="en-US" sz="2000" dirty="0"/>
+              <a:t>. </a:t>
+            </a:r>
+            <a:r>
+              <a:rPr lang="en-US" sz="2000" dirty="0" err="1"/>
+              <a:t>N.p</a:t>
+            </a:r>
+            <a:r>
+              <a:rPr lang="en-US" sz="2000" dirty="0"/>
+              <a:t>., 28 Aug. 2015. Web. 3 Apr. 2017. &lt;http://www.coindesk.com/information/what-is-bitcoin/&gt;.</a:t>
+            </a:r>
+          </a:p>
+          <a:p>
+            <a:r>
+              <a:rPr lang="en-US" sz="2000" dirty="0"/>
+              <a:t>[6] "Newest '</a:t>
+            </a:r>
+            <a:r>
+              <a:rPr lang="en-US" sz="2000" dirty="0" err="1"/>
+              <a:t>bitcoind</a:t>
+            </a:r>
+            <a:r>
+              <a:rPr lang="en-US" sz="2000" dirty="0"/>
+              <a:t>' Questions." </a:t>
+            </a:r>
+            <a:r>
+              <a:rPr lang="en-US" sz="2000" i="1" dirty="0"/>
+              <a:t>Newest '</a:t>
+            </a:r>
+            <a:r>
+              <a:rPr lang="en-US" sz="2000" i="1" dirty="0" err="1"/>
+              <a:t>bitcoind</a:t>
+            </a:r>
+            <a:r>
+              <a:rPr lang="en-US" sz="2000" i="1" dirty="0"/>
+              <a:t>' Questions</a:t>
+            </a:r>
+            <a:r>
+              <a:rPr lang="en-US" sz="2000" dirty="0"/>
+              <a:t>. Stack Exchange, </a:t>
+            </a:r>
+            <a:r>
+              <a:rPr lang="en-US" sz="2000" dirty="0" err="1"/>
+              <a:t>n.d.</a:t>
+            </a:r>
+            <a:r>
+              <a:rPr lang="en-US" sz="2000" dirty="0"/>
+              <a:t> Web. 3 Apr. 2017. &lt;http://bitcoin.stackexchange.com/questions/tagged/bitcoind&gt;.</a:t>
+            </a:r>
+          </a:p>
+          <a:p>
+            <a:endParaRPr lang="en-US" sz="2000" dirty="0">
               <a:latin typeface="Calibri (Body)"/>
             </a:endParaRPr>
           </a:p>
@@ -11574,7 +11737,7 @@
           <p:nvPr/>
         </p:nvPicPr>
         <p:blipFill>
-          <a:blip r:embed="rId13"/>
+          <a:blip r:embed="rId4"/>
           <a:stretch>
             <a:fillRect/>
           </a:stretch>
@@ -11589,10 +11752,431 @@
           </a:prstGeom>
         </p:spPr>
       </p:pic>
+      <p:sp>
+        <p:nvSpPr>
+          <p:cNvPr id="10" name="Footer Placeholder 5"/>
+          <p:cNvSpPr>
+            <a:spLocks noGrp="1"/>
+          </p:cNvSpPr>
+          <p:nvPr>
+            <p:ph type="ftr" sz="quarter" idx="11"/>
+          </p:nvPr>
+        </p:nvSpPr>
+        <p:spPr>
+          <a:xfrm>
+            <a:off x="685801" y="6327775"/>
+            <a:ext cx="7827659" cy="377825"/>
+          </a:xfrm>
+        </p:spPr>
+        <p:txBody>
+          <a:bodyPr/>
+          <a:lstStyle/>
+          <a:p>
+            <a:r>
+              <a:rPr lang="en-US" sz="1600" dirty="0">
+                <a:solidFill>
+                  <a:schemeClr val="bg1"/>
+                </a:solidFill>
+              </a:rPr>
+              <a:t>[2]</a:t>
+            </a:r>
+          </a:p>
+        </p:txBody>
+      </p:sp>
     </p:spTree>
     <p:extLst>
       <p:ext uri="{BB962C8B-B14F-4D97-AF65-F5344CB8AC3E}">
         <p14:creationId xmlns:p14="http://schemas.microsoft.com/office/powerpoint/2010/main" val="3065388541"/>
+      </p:ext>
+    </p:extLst>
+  </p:cSld>
+  <p:clrMapOvr>
+    <a:masterClrMapping/>
+  </p:clrMapOvr>
+</p:sld>
+</file>
+
+<file path=ppt/slides/slide15.xml><?xml version="1.0" encoding="utf-8"?>
+<p:sld xmlns:a="http://schemas.openxmlformats.org/drawingml/2006/main" xmlns:r="http://schemas.openxmlformats.org/officeDocument/2006/relationships" xmlns:p="http://schemas.openxmlformats.org/presentationml/2006/main">
+  <p:cSld>
+    <p:spTree>
+      <p:nvGrpSpPr>
+        <p:cNvPr id="1" name=""/>
+        <p:cNvGrpSpPr/>
+        <p:nvPr/>
+      </p:nvGrpSpPr>
+      <p:grpSpPr>
+        <a:xfrm>
+          <a:off x="0" y="0"/>
+          <a:ext cx="0" cy="0"/>
+          <a:chOff x="0" y="0"/>
+          <a:chExt cx="0" cy="0"/>
+        </a:xfrm>
+      </p:grpSpPr>
+      <p:sp>
+        <p:nvSpPr>
+          <p:cNvPr id="11" name="Title 10"/>
+          <p:cNvSpPr>
+            <a:spLocks noGrp="1"/>
+          </p:cNvSpPr>
+          <p:nvPr>
+            <p:ph type="title"/>
+          </p:nvPr>
+        </p:nvSpPr>
+        <p:spPr>
+          <a:xfrm>
+            <a:off x="442160" y="0"/>
+            <a:ext cx="10131425" cy="1456267"/>
+          </a:xfrm>
+        </p:spPr>
+        <p:txBody>
+          <a:bodyPr/>
+          <a:lstStyle/>
+          <a:p>
+            <a:r>
+              <a:rPr lang="en-CA" dirty="0"/>
+              <a:t>9.0 References p.2</a:t>
+            </a:r>
+          </a:p>
+        </p:txBody>
+      </p:sp>
+      <p:pic>
+        <p:nvPicPr>
+          <p:cNvPr id="7" name="Picture 6"/>
+          <p:cNvPicPr>
+            <a:picLocks noChangeAspect="1"/>
+          </p:cNvPicPr>
+          <p:nvPr/>
+        </p:nvPicPr>
+        <p:blipFill>
+          <a:blip r:embed="rId3"/>
+          <a:stretch>
+            <a:fillRect/>
+          </a:stretch>
+        </p:blipFill>
+        <p:spPr>
+          <a:xfrm>
+            <a:off x="261185" y="6296025"/>
+            <a:ext cx="361950" cy="409575"/>
+          </a:xfrm>
+          <a:prstGeom prst="rect">
+            <a:avLst/>
+          </a:prstGeom>
+        </p:spPr>
+      </p:pic>
+      <p:sp>
+        <p:nvSpPr>
+          <p:cNvPr id="9" name="Rectangle 8"/>
+          <p:cNvSpPr/>
+          <p:nvPr/>
+        </p:nvSpPr>
+        <p:spPr>
+          <a:xfrm>
+            <a:off x="11356339" y="6629400"/>
+            <a:ext cx="482601" cy="152400"/>
+          </a:xfrm>
+          <a:prstGeom prst="rect">
+            <a:avLst/>
+          </a:prstGeom>
+          <a:solidFill>
+            <a:schemeClr val="tx1"/>
+          </a:solidFill>
+          <a:ln>
+            <a:solidFill>
+              <a:schemeClr val="tx1"/>
+            </a:solidFill>
+          </a:ln>
+        </p:spPr>
+        <p:style>
+          <a:lnRef idx="2">
+            <a:schemeClr val="accent1">
+              <a:shade val="50000"/>
+            </a:schemeClr>
+          </a:lnRef>
+          <a:fillRef idx="1">
+            <a:schemeClr val="accent1"/>
+          </a:fillRef>
+          <a:effectRef idx="0">
+            <a:schemeClr val="accent1"/>
+          </a:effectRef>
+          <a:fontRef idx="minor">
+            <a:schemeClr val="lt1"/>
+          </a:fontRef>
+        </p:style>
+        <p:txBody>
+          <a:bodyPr rtlCol="0" anchor="ctr"/>
+          <a:lstStyle/>
+          <a:p>
+            <a:pPr algn="ctr"/>
+            <a:endParaRPr lang="en-CA"/>
+          </a:p>
+        </p:txBody>
+      </p:sp>
+      <p:sp>
+        <p:nvSpPr>
+          <p:cNvPr id="13" name="Slide Number Placeholder 12"/>
+          <p:cNvSpPr>
+            <a:spLocks noGrp="1"/>
+          </p:cNvSpPr>
+          <p:nvPr>
+            <p:ph type="sldNum" sz="quarter" idx="12"/>
+          </p:nvPr>
+        </p:nvSpPr>
+        <p:spPr>
+          <a:xfrm>
+            <a:off x="11356339" y="6545578"/>
+            <a:ext cx="551167" cy="377825"/>
+          </a:xfrm>
+        </p:spPr>
+        <p:txBody>
+          <a:bodyPr/>
+          <a:lstStyle/>
+          <a:p>
+            <a:fld id="{D57F1E4F-1CFF-5643-939E-02111984F565}" type="slidenum">
+              <a:rPr lang="en-US" sz="1200" smtClean="0">
+                <a:solidFill>
+                  <a:schemeClr val="bg1"/>
+                </a:solidFill>
+              </a:rPr>
+              <a:t>15</a:t>
+            </a:fld>
+            <a:endParaRPr lang="en-US" sz="1200" dirty="0">
+              <a:solidFill>
+                <a:schemeClr val="bg1"/>
+              </a:solidFill>
+            </a:endParaRPr>
+          </a:p>
+        </p:txBody>
+      </p:sp>
+      <p:sp>
+        <p:nvSpPr>
+          <p:cNvPr id="14" name="TextBox 13"/>
+          <p:cNvSpPr txBox="1"/>
+          <p:nvPr/>
+        </p:nvSpPr>
+        <p:spPr>
+          <a:xfrm>
+            <a:off x="570112" y="1148080"/>
+            <a:ext cx="3184944" cy="369332"/>
+          </a:xfrm>
+          <a:prstGeom prst="rect">
+            <a:avLst/>
+          </a:prstGeom>
+          <a:noFill/>
+        </p:spPr>
+        <p:txBody>
+          <a:bodyPr wrap="square" rtlCol="0">
+            <a:spAutoFit/>
+          </a:bodyPr>
+          <a:lstStyle/>
+          <a:p>
+            <a:endParaRPr lang="en-CA" dirty="0"/>
+          </a:p>
+        </p:txBody>
+      </p:sp>
+      <p:sp>
+        <p:nvSpPr>
+          <p:cNvPr id="12" name="TextBox 11"/>
+          <p:cNvSpPr txBox="1"/>
+          <p:nvPr/>
+        </p:nvSpPr>
+        <p:spPr>
+          <a:xfrm>
+            <a:off x="770137" y="1163734"/>
+            <a:ext cx="10240128" cy="4401205"/>
+          </a:xfrm>
+          <a:prstGeom prst="rect">
+            <a:avLst/>
+          </a:prstGeom>
+          <a:noFill/>
+        </p:spPr>
+        <p:txBody>
+          <a:bodyPr wrap="square" rtlCol="0">
+            <a:spAutoFit/>
+          </a:bodyPr>
+          <a:lstStyle/>
+          <a:p>
+            <a:r>
+              <a:rPr lang="en-US" sz="2000" dirty="0"/>
+              <a:t>[7] "Section 5.3: Matrix Representation of Graphs." </a:t>
+            </a:r>
+            <a:r>
+              <a:rPr lang="en-US" sz="2000" i="1" dirty="0"/>
+              <a:t>Section 5.3: Matrix Representation of Graphs</a:t>
+            </a:r>
+            <a:r>
+              <a:rPr lang="en-US" sz="2000" dirty="0"/>
+              <a:t>. University of Arkansas, </a:t>
+            </a:r>
+            <a:r>
+              <a:rPr lang="en-US" sz="2000" dirty="0" err="1"/>
+              <a:t>n.d.</a:t>
+            </a:r>
+            <a:r>
+              <a:rPr lang="en-US" sz="2000" dirty="0"/>
+              <a:t> Web. 3 Apr. 2017. &lt;http://cpsc.ualr.edu/srini/DM/chapters/review5.3.html&gt;.</a:t>
+            </a:r>
+          </a:p>
+          <a:p>
+            <a:r>
+              <a:rPr lang="en-US" sz="2000" dirty="0"/>
+              <a:t>[8] Abdi, </a:t>
+            </a:r>
+            <a:r>
+              <a:rPr lang="en-US" sz="2000" dirty="0" err="1"/>
+              <a:t>Herve</a:t>
+            </a:r>
+            <a:r>
+              <a:rPr lang="en-US" sz="2000" dirty="0"/>
+              <a:t>, and Lynne J. Williams. "Principal Component Analysis." </a:t>
+            </a:r>
+            <a:r>
+              <a:rPr lang="en-US" sz="2000" i="1" dirty="0"/>
+              <a:t>Introduction to Securitization</a:t>
+            </a:r>
+            <a:r>
+              <a:rPr lang="en-US" sz="2000" dirty="0"/>
+              <a:t> (2011): 1-12. </a:t>
+            </a:r>
+            <a:r>
+              <a:rPr lang="en-US" sz="2000" i="1" dirty="0"/>
+              <a:t>Semantic Scholar</a:t>
+            </a:r>
+            <a:r>
+              <a:rPr lang="en-US" sz="2000" dirty="0"/>
+              <a:t>. Wiley Interdisciplinary Reviews: Computational Statistics, 2010. Web. 3 Apr. 2017. &lt;https://pdfs.semanticscholar.org/53b9/966a0333c9c9198cdf03efc073e991647c12.pdf&gt;.</a:t>
+            </a:r>
+          </a:p>
+          <a:p>
+            <a:r>
+              <a:rPr lang="en-US" sz="2000" dirty="0"/>
+              <a:t>[9] "Making Sense of Principal Component Analysis, Eigenvectors &amp; Eigenvalues." </a:t>
+            </a:r>
+            <a:r>
+              <a:rPr lang="en-US" sz="2000" i="1" dirty="0" err="1"/>
+              <a:t>Pca</a:t>
+            </a:r>
+            <a:r>
+              <a:rPr lang="en-US" sz="2000" i="1" dirty="0"/>
+              <a:t> - Making Sense of Principal Component Analysis, Eigenvectors &amp; Eigenvalues - Cross Validated</a:t>
+            </a:r>
+            <a:r>
+              <a:rPr lang="en-US" sz="2000" dirty="0"/>
+              <a:t>. Stack Exchange, </a:t>
+            </a:r>
+            <a:r>
+              <a:rPr lang="en-US" sz="2000" dirty="0" err="1"/>
+              <a:t>n.d.</a:t>
+            </a:r>
+            <a:r>
+              <a:rPr lang="en-US" sz="2000" dirty="0"/>
+              <a:t> Web. 04 Apr. 2017. &lt;http://stats.stackexchange.com/questions/2691/making-sense-of-principal-component-analysis-eigenvectors-eigenvalues&gt;.</a:t>
+            </a:r>
+          </a:p>
+          <a:p>
+            <a:r>
+              <a:rPr lang="en-US" sz="2000" dirty="0"/>
+              <a:t>[10] </a:t>
+            </a:r>
+            <a:r>
+              <a:rPr lang="en-US" sz="2000" dirty="0" err="1"/>
+              <a:t>Ethereum</a:t>
+            </a:r>
+            <a:r>
+              <a:rPr lang="en-US" sz="2000" dirty="0"/>
+              <a:t> Logo. Digital image. </a:t>
+            </a:r>
+            <a:r>
+              <a:rPr lang="en-US" sz="2000" i="1" dirty="0" err="1"/>
+              <a:t>Ethereum</a:t>
+            </a:r>
+            <a:r>
+              <a:rPr lang="en-US" sz="2000" dirty="0"/>
+              <a:t>. </a:t>
+            </a:r>
+            <a:r>
+              <a:rPr lang="en-US" sz="2000" dirty="0" err="1"/>
+              <a:t>N.p</a:t>
+            </a:r>
+            <a:r>
+              <a:rPr lang="en-US" sz="2000" dirty="0"/>
+              <a:t>., </a:t>
+            </a:r>
+            <a:r>
+              <a:rPr lang="en-US" sz="2000" dirty="0" err="1"/>
+              <a:t>n.d.</a:t>
+            </a:r>
+            <a:r>
+              <a:rPr lang="en-US" sz="2000" dirty="0"/>
+              <a:t> Web. 3 Apr. 2017. &lt;https://www.ethereum.org/images/logos/ETHEREUM-LOGO_LANDSCAPE_Black.png&gt;.</a:t>
+            </a:r>
+          </a:p>
+          <a:p>
+            <a:endParaRPr lang="en-US" sz="2000" dirty="0">
+              <a:latin typeface="Calibri (Body)"/>
+            </a:endParaRPr>
+          </a:p>
+        </p:txBody>
+      </p:sp>
+      <p:pic>
+        <p:nvPicPr>
+          <p:cNvPr id="15" name="Picture 14"/>
+          <p:cNvPicPr>
+            <a:picLocks noChangeAspect="1"/>
+          </p:cNvPicPr>
+          <p:nvPr/>
+        </p:nvPicPr>
+        <p:blipFill>
+          <a:blip r:embed="rId4"/>
+          <a:stretch>
+            <a:fillRect/>
+          </a:stretch>
+        </p:blipFill>
+        <p:spPr>
+          <a:xfrm>
+            <a:off x="10264596" y="6152444"/>
+            <a:ext cx="1510220" cy="705556"/>
+          </a:xfrm>
+          <a:prstGeom prst="rect">
+            <a:avLst/>
+          </a:prstGeom>
+        </p:spPr>
+      </p:pic>
+      <p:sp>
+        <p:nvSpPr>
+          <p:cNvPr id="10" name="Footer Placeholder 5"/>
+          <p:cNvSpPr>
+            <a:spLocks noGrp="1"/>
+          </p:cNvSpPr>
+          <p:nvPr>
+            <p:ph type="ftr" sz="quarter" idx="11"/>
+          </p:nvPr>
+        </p:nvSpPr>
+        <p:spPr>
+          <a:xfrm>
+            <a:off x="685801" y="6327775"/>
+            <a:ext cx="7827659" cy="377825"/>
+          </a:xfrm>
+        </p:spPr>
+        <p:txBody>
+          <a:bodyPr/>
+          <a:lstStyle/>
+          <a:p>
+            <a:r>
+              <a:rPr lang="en-US" sz="1600" dirty="0">
+                <a:solidFill>
+                  <a:schemeClr val="bg1"/>
+                </a:solidFill>
+              </a:rPr>
+              <a:t>[2]</a:t>
+            </a:r>
+          </a:p>
+        </p:txBody>
+      </p:sp>
+    </p:spTree>
+    <p:extLst>
+      <p:ext uri="{BB962C8B-B14F-4D97-AF65-F5344CB8AC3E}">
+        <p14:creationId xmlns:p14="http://schemas.microsoft.com/office/powerpoint/2010/main" val="3869684293"/>
       </p:ext>
     </p:extLst>
   </p:cSld>
@@ -11873,6 +12457,37 @@
           </a:prstGeom>
         </p:spPr>
       </p:pic>
+      <p:sp>
+        <p:nvSpPr>
+          <p:cNvPr id="10" name="Footer Placeholder 5"/>
+          <p:cNvSpPr>
+            <a:spLocks noGrp="1"/>
+          </p:cNvSpPr>
+          <p:nvPr>
+            <p:ph type="ftr" sz="quarter" idx="11"/>
+          </p:nvPr>
+        </p:nvSpPr>
+        <p:spPr>
+          <a:xfrm>
+            <a:off x="685801" y="6327775"/>
+            <a:ext cx="7827659" cy="377825"/>
+          </a:xfrm>
+        </p:spPr>
+        <p:txBody>
+          <a:bodyPr/>
+          <a:lstStyle/>
+          <a:p>
+            <a:r>
+              <a:rPr lang="en-US" sz="1600" dirty="0">
+                <a:solidFill>
+                  <a:schemeClr val="bg1"/>
+                </a:solidFill>
+              </a:rPr>
+              <a:t>[2]</a:t>
+            </a:r>
+          </a:p>
+        </p:txBody>
+      </p:sp>
     </p:spTree>
     <p:extLst>
       <p:ext uri="{BB962C8B-B14F-4D97-AF65-F5344CB8AC3E}">
@@ -12190,6 +12805,133 @@
           </a:prstGeom>
         </p:spPr>
       </p:pic>
+      <p:sp>
+        <p:nvSpPr>
+          <p:cNvPr id="18" name="Footer Placeholder 5"/>
+          <p:cNvSpPr txBox="1">
+            <a:spLocks/>
+          </p:cNvSpPr>
+          <p:nvPr/>
+        </p:nvSpPr>
+        <p:spPr>
+          <a:xfrm>
+            <a:off x="685800" y="6313226"/>
+            <a:ext cx="7827659" cy="377825"/>
+          </a:xfrm>
+          <a:prstGeom prst="rect">
+            <a:avLst/>
+          </a:prstGeom>
+        </p:spPr>
+        <p:txBody>
+          <a:bodyPr vert="horz" lIns="91440" tIns="45720" rIns="91440" bIns="45720" rtlCol="0" anchor="ctr"/>
+          <a:lstStyle>
+            <a:defPPr>
+              <a:defRPr lang="en-US"/>
+            </a:defPPr>
+            <a:lvl1pPr marL="0" algn="l" defTabSz="457200" rtl="0" eaLnBrk="1" latinLnBrk="0" hangingPunct="1">
+              <a:defRPr sz="1000" b="0" i="0" kern="1200">
+                <a:solidFill>
+                  <a:schemeClr val="tx1"/>
+                </a:solidFill>
+                <a:effectLst/>
+                <a:latin typeface="+mn-lt"/>
+                <a:ea typeface="+mn-ea"/>
+                <a:cs typeface="+mn-cs"/>
+              </a:defRPr>
+            </a:lvl1pPr>
+            <a:lvl2pPr marL="457200" algn="l" defTabSz="457200" rtl="0" eaLnBrk="1" latinLnBrk="0" hangingPunct="1">
+              <a:defRPr sz="1800" kern="1200">
+                <a:solidFill>
+                  <a:schemeClr val="tx1"/>
+                </a:solidFill>
+                <a:latin typeface="+mn-lt"/>
+                <a:ea typeface="+mn-ea"/>
+                <a:cs typeface="+mn-cs"/>
+              </a:defRPr>
+            </a:lvl2pPr>
+            <a:lvl3pPr marL="914400" algn="l" defTabSz="457200" rtl="0" eaLnBrk="1" latinLnBrk="0" hangingPunct="1">
+              <a:defRPr sz="1800" kern="1200">
+                <a:solidFill>
+                  <a:schemeClr val="tx1"/>
+                </a:solidFill>
+                <a:latin typeface="+mn-lt"/>
+                <a:ea typeface="+mn-ea"/>
+                <a:cs typeface="+mn-cs"/>
+              </a:defRPr>
+            </a:lvl3pPr>
+            <a:lvl4pPr marL="1371600" algn="l" defTabSz="457200" rtl="0" eaLnBrk="1" latinLnBrk="0" hangingPunct="1">
+              <a:defRPr sz="1800" kern="1200">
+                <a:solidFill>
+                  <a:schemeClr val="tx1"/>
+                </a:solidFill>
+                <a:latin typeface="+mn-lt"/>
+                <a:ea typeface="+mn-ea"/>
+                <a:cs typeface="+mn-cs"/>
+              </a:defRPr>
+            </a:lvl4pPr>
+            <a:lvl5pPr marL="1828800" algn="l" defTabSz="457200" rtl="0" eaLnBrk="1" latinLnBrk="0" hangingPunct="1">
+              <a:defRPr sz="1800" kern="1200">
+                <a:solidFill>
+                  <a:schemeClr val="tx1"/>
+                </a:solidFill>
+                <a:latin typeface="+mn-lt"/>
+                <a:ea typeface="+mn-ea"/>
+                <a:cs typeface="+mn-cs"/>
+              </a:defRPr>
+            </a:lvl5pPr>
+            <a:lvl6pPr marL="2286000" algn="l" defTabSz="457200" rtl="0" eaLnBrk="1" latinLnBrk="0" hangingPunct="1">
+              <a:defRPr sz="1800" kern="1200">
+                <a:solidFill>
+                  <a:schemeClr val="tx1"/>
+                </a:solidFill>
+                <a:latin typeface="+mn-lt"/>
+                <a:ea typeface="+mn-ea"/>
+                <a:cs typeface="+mn-cs"/>
+              </a:defRPr>
+            </a:lvl6pPr>
+            <a:lvl7pPr marL="2743200" algn="l" defTabSz="457200" rtl="0" eaLnBrk="1" latinLnBrk="0" hangingPunct="1">
+              <a:defRPr sz="1800" kern="1200">
+                <a:solidFill>
+                  <a:schemeClr val="tx1"/>
+                </a:solidFill>
+                <a:latin typeface="+mn-lt"/>
+                <a:ea typeface="+mn-ea"/>
+                <a:cs typeface="+mn-cs"/>
+              </a:defRPr>
+            </a:lvl7pPr>
+            <a:lvl8pPr marL="3200400" algn="l" defTabSz="457200" rtl="0" eaLnBrk="1" latinLnBrk="0" hangingPunct="1">
+              <a:defRPr sz="1800" kern="1200">
+                <a:solidFill>
+                  <a:schemeClr val="tx1"/>
+                </a:solidFill>
+                <a:latin typeface="+mn-lt"/>
+                <a:ea typeface="+mn-ea"/>
+                <a:cs typeface="+mn-cs"/>
+              </a:defRPr>
+            </a:lvl8pPr>
+            <a:lvl9pPr marL="3657600" algn="l" defTabSz="457200" rtl="0" eaLnBrk="1" latinLnBrk="0" hangingPunct="1">
+              <a:defRPr sz="1800" kern="1200">
+                <a:solidFill>
+                  <a:schemeClr val="tx1"/>
+                </a:solidFill>
+                <a:latin typeface="+mn-lt"/>
+                <a:ea typeface="+mn-ea"/>
+                <a:cs typeface="+mn-cs"/>
+              </a:defRPr>
+            </a:lvl9pPr>
+          </a:lstStyle>
+          <a:p>
+            <a:r>
+              <a:rPr lang="en-US" sz="1600" dirty="0">
+                <a:solidFill>
+                  <a:schemeClr val="bg1"/>
+                </a:solidFill>
+              </a:rPr>
+              <a:t>[1], [2]</a:t>
+            </a:r>
+          </a:p>
+        </p:txBody>
+      </p:sp>
     </p:spTree>
     <p:extLst>
       <p:ext uri="{BB962C8B-B14F-4D97-AF65-F5344CB8AC3E}">
@@ -12552,53 +13294,12 @@
           <a:lstStyle/>
           <a:p>
             <a:r>
-              <a:rPr lang="en-US" dirty="0">
+              <a:rPr lang="en-US" sz="1600" dirty="0">
                 <a:solidFill>
                   <a:schemeClr val="bg1"/>
                 </a:solidFill>
-                <a:hlinkClick r:id="rId4"/>
               </a:rPr>
-              <a:t>http://www.bitcoinblockhalf.com/</a:t>
-            </a:r>
-            <a:endParaRPr lang="en-US" dirty="0">
-              <a:solidFill>
-                <a:schemeClr val="bg1"/>
-              </a:solidFill>
-            </a:endParaRPr>
-          </a:p>
-          <a:p>
-            <a:r>
-              <a:rPr lang="en-US" dirty="0">
-                <a:solidFill>
-                  <a:schemeClr val="bg1"/>
-                </a:solidFill>
-                <a:hlinkClick r:id="rId5"/>
-              </a:rPr>
-              <a:t>https://bitcoin.org/img/icons/opengraph.png</a:t>
-            </a:r>
-            <a:endParaRPr lang="en-US" dirty="0">
-              <a:solidFill>
-                <a:schemeClr val="bg1"/>
-              </a:solidFill>
-            </a:endParaRPr>
-          </a:p>
-          <a:p>
-            <a:r>
-              <a:rPr lang="en-US" dirty="0">
-                <a:solidFill>
-                  <a:schemeClr val="bg1"/>
-                </a:solidFill>
-                <a:hlinkClick r:id="rId6"/>
-              </a:rPr>
-              <a:t>http://www.coindesk.com/information/what-is-bitcoin/</a:t>
-            </a:r>
-            <a:r>
-              <a:rPr lang="en-US" dirty="0">
-                <a:solidFill>
-                  <a:schemeClr val="bg1"/>
-                </a:solidFill>
-              </a:rPr>
-              <a:t> </a:t>
+              <a:t>[1], [2], [3], [4], [5]</a:t>
             </a:r>
           </a:p>
         </p:txBody>
@@ -12612,7 +13313,7 @@
           <p:nvPr/>
         </p:nvPicPr>
         <p:blipFill>
-          <a:blip r:embed="rId7"/>
+          <a:blip r:embed="rId4"/>
           <a:stretch>
             <a:fillRect/>
           </a:stretch>
@@ -12636,7 +13337,7 @@
           <p:nvPr/>
         </p:nvPicPr>
         <p:blipFill>
-          <a:blip r:embed="rId8"/>
+          <a:blip r:embed="rId5"/>
           <a:stretch>
             <a:fillRect/>
           </a:stretch>
@@ -12955,6 +13656,37 @@
           </a:prstGeom>
         </p:spPr>
       </p:pic>
+      <p:sp>
+        <p:nvSpPr>
+          <p:cNvPr id="15" name="Footer Placeholder 5"/>
+          <p:cNvSpPr>
+            <a:spLocks noGrp="1"/>
+          </p:cNvSpPr>
+          <p:nvPr>
+            <p:ph type="ftr" sz="quarter" idx="11"/>
+          </p:nvPr>
+        </p:nvSpPr>
+        <p:spPr>
+          <a:xfrm>
+            <a:off x="685801" y="6327775"/>
+            <a:ext cx="7827659" cy="377825"/>
+          </a:xfrm>
+        </p:spPr>
+        <p:txBody>
+          <a:bodyPr/>
+          <a:lstStyle/>
+          <a:p>
+            <a:r>
+              <a:rPr lang="en-US" sz="1600" dirty="0">
+                <a:solidFill>
+                  <a:schemeClr val="bg1"/>
+                </a:solidFill>
+              </a:rPr>
+              <a:t>[1], [2]</a:t>
+            </a:r>
+          </a:p>
+        </p:txBody>
+      </p:sp>
     </p:spTree>
     <p:extLst>
       <p:ext uri="{BB962C8B-B14F-4D97-AF65-F5344CB8AC3E}">
@@ -13333,12 +14065,12 @@
           <a:lstStyle/>
           <a:p>
             <a:r>
-              <a:rPr lang="en-US" dirty="0">
+              <a:rPr lang="en-US" sz="1600" dirty="0">
                 <a:solidFill>
                   <a:schemeClr val="bg1"/>
                 </a:solidFill>
               </a:rPr>
-              <a:t>http://bitcoin.stackexchange.com/questions/tagged/bitcoind</a:t>
+              <a:t>[1], [2], [6]</a:t>
             </a:r>
           </a:p>
         </p:txBody>
@@ -13650,6 +14382,37 @@
           </a:p>
         </p:txBody>
       </p:sp>
+      <p:sp>
+        <p:nvSpPr>
+          <p:cNvPr id="8" name="Footer Placeholder 5"/>
+          <p:cNvSpPr>
+            <a:spLocks noGrp="1"/>
+          </p:cNvSpPr>
+          <p:nvPr>
+            <p:ph type="ftr" sz="quarter" idx="11"/>
+          </p:nvPr>
+        </p:nvSpPr>
+        <p:spPr>
+          <a:xfrm>
+            <a:off x="685801" y="6327775"/>
+            <a:ext cx="7827659" cy="377825"/>
+          </a:xfrm>
+        </p:spPr>
+        <p:txBody>
+          <a:bodyPr/>
+          <a:lstStyle/>
+          <a:p>
+            <a:r>
+              <a:rPr lang="en-US" sz="1600" dirty="0">
+                <a:solidFill>
+                  <a:schemeClr val="bg1"/>
+                </a:solidFill>
+              </a:rPr>
+              <a:t>[1], [2]</a:t>
+            </a:r>
+          </a:p>
+        </p:txBody>
+      </p:sp>
     </p:spTree>
     <p:extLst>
       <p:ext uri="{BB962C8B-B14F-4D97-AF65-F5344CB8AC3E}">
@@ -13953,6 +14716,37 @@
           </a:p>
           <a:p>
             <a:endParaRPr lang="en-CA" sz="2000" dirty="0"/>
+          </a:p>
+        </p:txBody>
+      </p:sp>
+      <p:sp>
+        <p:nvSpPr>
+          <p:cNvPr id="8" name="Footer Placeholder 5"/>
+          <p:cNvSpPr>
+            <a:spLocks noGrp="1"/>
+          </p:cNvSpPr>
+          <p:nvPr>
+            <p:ph type="ftr" sz="quarter" idx="11"/>
+          </p:nvPr>
+        </p:nvSpPr>
+        <p:spPr>
+          <a:xfrm>
+            <a:off x="685801" y="6327775"/>
+            <a:ext cx="7827659" cy="377825"/>
+          </a:xfrm>
+        </p:spPr>
+        <p:txBody>
+          <a:bodyPr/>
+          <a:lstStyle/>
+          <a:p>
+            <a:r>
+              <a:rPr lang="en-US" sz="1600" dirty="0">
+                <a:solidFill>
+                  <a:schemeClr val="bg1"/>
+                </a:solidFill>
+              </a:rPr>
+              <a:t>[1], [2]</a:t>
+            </a:r>
           </a:p>
         </p:txBody>
       </p:sp>
@@ -14305,7 +15099,7 @@
       </p:pic>
       <p:sp>
         <p:nvSpPr>
-          <p:cNvPr id="12" name="Footer Placeholder 5"/>
+          <p:cNvPr id="14" name="Footer Placeholder 5"/>
           <p:cNvSpPr>
             <a:spLocks noGrp="1"/>
           </p:cNvSpPr>
@@ -14324,12 +15118,12 @@
           <a:lstStyle/>
           <a:p>
             <a:r>
-              <a:rPr lang="en-US" dirty="0">
+              <a:rPr lang="en-US" sz="1600" dirty="0">
                 <a:solidFill>
                   <a:schemeClr val="bg1"/>
                 </a:solidFill>
               </a:rPr>
-              <a:t>http://cpsc.ualr.edu/srini/DM/chapters/review5.3.html</a:t>
+              <a:t>[1], [2], [7]</a:t>
             </a:r>
           </a:p>
         </p:txBody>

</xml_diff>